<commit_message>
update lec01 and lec02
</commit_message>
<xml_diff>
--- a/courses/theory/slides/lec01-overview.pptx
+++ b/courses/theory/slides/lec01-overview.pptx
@@ -5,28 +5,28 @@
     <p:sldMasterId id="2147483648" r:id="rId1"/>
   </p:sldMasterIdLst>
   <p:handoutMasterIdLst>
-    <p:handoutMasterId r:id="rId19"/>
+    <p:handoutMasterId r:id="rId18"/>
   </p:handoutMasterIdLst>
   <p:sldIdLst>
-    <p:sldId id="256" r:id="rId3"/>
-    <p:sldId id="306" r:id="rId4"/>
-    <p:sldId id="311" r:id="rId5"/>
-    <p:sldId id="312" r:id="rId6"/>
-    <p:sldId id="274" r:id="rId7"/>
-    <p:sldId id="309" r:id="rId8"/>
-    <p:sldId id="308" r:id="rId9"/>
-    <p:sldId id="313" r:id="rId10"/>
-    <p:sldId id="287" r:id="rId11"/>
-    <p:sldId id="310" r:id="rId12"/>
-    <p:sldId id="288" r:id="rId13"/>
-    <p:sldId id="305" r:id="rId14"/>
-    <p:sldId id="295" r:id="rId15"/>
-    <p:sldId id="314" r:id="rId16"/>
-    <p:sldId id="303" r:id="rId17"/>
-    <p:sldId id="304" r:id="rId18"/>
+    <p:sldId id="256" r:id="rId2"/>
+    <p:sldId id="306" r:id="rId3"/>
+    <p:sldId id="311" r:id="rId4"/>
+    <p:sldId id="312" r:id="rId5"/>
+    <p:sldId id="274" r:id="rId6"/>
+    <p:sldId id="309" r:id="rId7"/>
+    <p:sldId id="308" r:id="rId8"/>
+    <p:sldId id="313" r:id="rId9"/>
+    <p:sldId id="287" r:id="rId10"/>
+    <p:sldId id="310" r:id="rId11"/>
+    <p:sldId id="288" r:id="rId12"/>
+    <p:sldId id="305" r:id="rId13"/>
+    <p:sldId id="295" r:id="rId14"/>
+    <p:sldId id="314" r:id="rId15"/>
+    <p:sldId id="303" r:id="rId16"/>
+    <p:sldId id="304" r:id="rId17"/>
   </p:sldIdLst>
   <p:sldSz cx="9144000" cy="6858000" type="screen4x3"/>
-  <p:notesSz cx="7099300" cy="10234295"/>
+  <p:notesSz cx="7099300" cy="10234613"/>
   <p:defaultTextStyle>
     <a:defPPr>
       <a:defRPr lang="zh-CN"/>
@@ -42,7 +42,7 @@
         <a:solidFill>
           <a:schemeClr val="tx1"/>
         </a:solidFill>
-        <a:latin typeface="Tahoma" panose="020B0604030504040204" pitchFamily="34" charset="0"/>
+        <a:latin typeface="Tahoma" panose="020B0804030504040204" pitchFamily="34" charset="0"/>
         <a:ea typeface="宋体" panose="02010600030101010101" pitchFamily="2" charset="-122"/>
         <a:cs typeface="+mn-cs"/>
       </a:defRPr>
@@ -58,7 +58,7 @@
         <a:solidFill>
           <a:schemeClr val="tx1"/>
         </a:solidFill>
-        <a:latin typeface="Tahoma" panose="020B0604030504040204" pitchFamily="34" charset="0"/>
+        <a:latin typeface="Tahoma" panose="020B0804030504040204" pitchFamily="34" charset="0"/>
         <a:ea typeface="宋体" panose="02010600030101010101" pitchFamily="2" charset="-122"/>
         <a:cs typeface="+mn-cs"/>
       </a:defRPr>
@@ -74,7 +74,7 @@
         <a:solidFill>
           <a:schemeClr val="tx1"/>
         </a:solidFill>
-        <a:latin typeface="Tahoma" panose="020B0604030504040204" pitchFamily="34" charset="0"/>
+        <a:latin typeface="Tahoma" panose="020B0804030504040204" pitchFamily="34" charset="0"/>
         <a:ea typeface="宋体" panose="02010600030101010101" pitchFamily="2" charset="-122"/>
         <a:cs typeface="+mn-cs"/>
       </a:defRPr>
@@ -90,7 +90,7 @@
         <a:solidFill>
           <a:schemeClr val="tx1"/>
         </a:solidFill>
-        <a:latin typeface="Tahoma" panose="020B0604030504040204" pitchFamily="34" charset="0"/>
+        <a:latin typeface="Tahoma" panose="020B0804030504040204" pitchFamily="34" charset="0"/>
         <a:ea typeface="宋体" panose="02010600030101010101" pitchFamily="2" charset="-122"/>
         <a:cs typeface="+mn-cs"/>
       </a:defRPr>
@@ -106,7 +106,7 @@
         <a:solidFill>
           <a:schemeClr val="tx1"/>
         </a:solidFill>
-        <a:latin typeface="Tahoma" panose="020B0604030504040204" pitchFamily="34" charset="0"/>
+        <a:latin typeface="Tahoma" panose="020B0804030504040204" pitchFamily="34" charset="0"/>
         <a:ea typeface="宋体" panose="02010600030101010101" pitchFamily="2" charset="-122"/>
         <a:cs typeface="+mn-cs"/>
       </a:defRPr>
@@ -116,7 +116,7 @@
         <a:solidFill>
           <a:schemeClr val="tx1"/>
         </a:solidFill>
-        <a:latin typeface="Tahoma" panose="020B0604030504040204" pitchFamily="34" charset="0"/>
+        <a:latin typeface="Tahoma" panose="020B0804030504040204" pitchFamily="34" charset="0"/>
         <a:ea typeface="宋体" panose="02010600030101010101" pitchFamily="2" charset="-122"/>
         <a:cs typeface="+mn-cs"/>
       </a:defRPr>
@@ -126,7 +126,7 @@
         <a:solidFill>
           <a:schemeClr val="tx1"/>
         </a:solidFill>
-        <a:latin typeface="Tahoma" panose="020B0604030504040204" pitchFamily="34" charset="0"/>
+        <a:latin typeface="Tahoma" panose="020B0804030504040204" pitchFamily="34" charset="0"/>
         <a:ea typeface="宋体" panose="02010600030101010101" pitchFamily="2" charset="-122"/>
         <a:cs typeface="+mn-cs"/>
       </a:defRPr>
@@ -136,7 +136,7 @@
         <a:solidFill>
           <a:schemeClr val="tx1"/>
         </a:solidFill>
-        <a:latin typeface="Tahoma" panose="020B0604030504040204" pitchFamily="34" charset="0"/>
+        <a:latin typeface="Tahoma" panose="020B0804030504040204" pitchFamily="34" charset="0"/>
         <a:ea typeface="宋体" panose="02010600030101010101" pitchFamily="2" charset="-122"/>
         <a:cs typeface="+mn-cs"/>
       </a:defRPr>
@@ -146,12 +146,42 @@
         <a:solidFill>
           <a:schemeClr val="tx1"/>
         </a:solidFill>
-        <a:latin typeface="Tahoma" panose="020B0604030504040204" pitchFamily="34" charset="0"/>
+        <a:latin typeface="Tahoma" panose="020B0804030504040204" pitchFamily="34" charset="0"/>
         <a:ea typeface="宋体" panose="02010600030101010101" pitchFamily="2" charset="-122"/>
         <a:cs typeface="+mn-cs"/>
       </a:defRPr>
     </a:lvl9pPr>
   </p:defaultTextStyle>
+  <p:extLst>
+    <p:ext uri="{EFAFB233-063F-42B5-8137-9DF3F51BA10A}">
+      <p15:sldGuideLst xmlns:p15="http://schemas.microsoft.com/office/powerpoint/2012/main">
+        <p15:guide id="1" orient="horz" pos="2160">
+          <p15:clr>
+            <a:srgbClr val="A4A3A4"/>
+          </p15:clr>
+        </p15:guide>
+        <p15:guide id="2" pos="2880">
+          <p15:clr>
+            <a:srgbClr val="A4A3A4"/>
+          </p15:clr>
+        </p15:guide>
+      </p15:sldGuideLst>
+    </p:ext>
+    <p:ext uri="{2D200454-40CA-4A62-9FC3-DE9A4176ACB9}">
+      <p15:notesGuideLst xmlns:p15="http://schemas.microsoft.com/office/powerpoint/2012/main">
+        <p15:guide id="1" orient="horz" pos="3224">
+          <p15:clr>
+            <a:srgbClr val="A4A3A4"/>
+          </p15:clr>
+        </p15:guide>
+        <p15:guide id="2" pos="2236">
+          <p15:clr>
+            <a:srgbClr val="A4A3A4"/>
+          </p15:clr>
+        </p15:guide>
+      </p15:notesGuideLst>
+    </p:ext>
+  </p:extLst>
 </p:presentation>
 </file>
 
@@ -346,6 +376,7 @@
             </a:pPr>
             <a:fld id="{FB79614D-13DE-514C-93E7-57A8BB3CE43E}" type="slidenum">
               <a:rPr lang="en-US" altLang="zh-CN"/>
+              <a:t>‹#›</a:t>
             </a:fld>
             <a:endParaRPr lang="en-US" altLang="zh-CN"/>
           </a:p>
@@ -358,7 +389,7 @@
 </file>
 
 <file path=ppt/slideLayouts/slideLayout1.xml><?xml version="1.0" encoding="utf-8"?>
-<p:sldLayout xmlns:a="http://schemas.openxmlformats.org/drawingml/2006/main" xmlns:r="http://schemas.openxmlformats.org/officeDocument/2006/relationships" xmlns:p="http://schemas.openxmlformats.org/presentationml/2006/main" type="title" preserve="1" showMasterSp="0">
+<p:sldLayout xmlns:a="http://schemas.openxmlformats.org/drawingml/2006/main" xmlns:r="http://schemas.openxmlformats.org/officeDocument/2006/relationships" xmlns:p="http://schemas.openxmlformats.org/presentationml/2006/main" showMasterSp="0" type="title" preserve="1">
   <p:cSld name="标题幻灯片">
     <p:spTree>
       <p:nvGrpSpPr>
@@ -445,7 +476,7 @@
                     <a:solidFill>
                       <a:schemeClr val="tx1"/>
                     </a:solidFill>
-                    <a:latin typeface="Tahoma" panose="020B0604030504040204" pitchFamily="34" charset="0"/>
+                    <a:latin typeface="Tahoma" panose="020B0804030504040204" pitchFamily="34" charset="0"/>
                     <a:ea typeface="宋体" panose="02010600030101010101" pitchFamily="2" charset="-122"/>
                   </a:defRPr>
                 </a:lvl1pPr>
@@ -454,7 +485,7 @@
                     <a:solidFill>
                       <a:schemeClr val="tx1"/>
                     </a:solidFill>
-                    <a:latin typeface="Tahoma" panose="020B0604030504040204" pitchFamily="34" charset="0"/>
+                    <a:latin typeface="Tahoma" panose="020B0804030504040204" pitchFamily="34" charset="0"/>
                     <a:ea typeface="宋体" panose="02010600030101010101" pitchFamily="2" charset="-122"/>
                   </a:defRPr>
                 </a:lvl2pPr>
@@ -463,7 +494,7 @@
                     <a:solidFill>
                       <a:schemeClr val="tx1"/>
                     </a:solidFill>
-                    <a:latin typeface="Tahoma" panose="020B0604030504040204" pitchFamily="34" charset="0"/>
+                    <a:latin typeface="Tahoma" panose="020B0804030504040204" pitchFamily="34" charset="0"/>
                     <a:ea typeface="宋体" panose="02010600030101010101" pitchFamily="2" charset="-122"/>
                   </a:defRPr>
                 </a:lvl3pPr>
@@ -472,7 +503,7 @@
                     <a:solidFill>
                       <a:schemeClr val="tx1"/>
                     </a:solidFill>
-                    <a:latin typeface="Tahoma" panose="020B0604030504040204" pitchFamily="34" charset="0"/>
+                    <a:latin typeface="Tahoma" panose="020B0804030504040204" pitchFamily="34" charset="0"/>
                     <a:ea typeface="宋体" panose="02010600030101010101" pitchFamily="2" charset="-122"/>
                   </a:defRPr>
                 </a:lvl4pPr>
@@ -481,7 +512,7 @@
                     <a:solidFill>
                       <a:schemeClr val="tx1"/>
                     </a:solidFill>
-                    <a:latin typeface="Tahoma" panose="020B0604030504040204" pitchFamily="34" charset="0"/>
+                    <a:latin typeface="Tahoma" panose="020B0804030504040204" pitchFamily="34" charset="0"/>
                     <a:ea typeface="宋体" panose="02010600030101010101" pitchFamily="2" charset="-122"/>
                   </a:defRPr>
                 </a:lvl5pPr>
@@ -496,7 +527,7 @@
                     <a:solidFill>
                       <a:schemeClr val="tx1"/>
                     </a:solidFill>
-                    <a:latin typeface="Tahoma" panose="020B0604030504040204" pitchFamily="34" charset="0"/>
+                    <a:latin typeface="Tahoma" panose="020B0804030504040204" pitchFamily="34" charset="0"/>
                     <a:ea typeface="宋体" panose="02010600030101010101" pitchFamily="2" charset="-122"/>
                   </a:defRPr>
                 </a:lvl6pPr>
@@ -511,7 +542,7 @@
                     <a:solidFill>
                       <a:schemeClr val="tx1"/>
                     </a:solidFill>
-                    <a:latin typeface="Tahoma" panose="020B0604030504040204" pitchFamily="34" charset="0"/>
+                    <a:latin typeface="Tahoma" panose="020B0804030504040204" pitchFamily="34" charset="0"/>
                     <a:ea typeface="宋体" panose="02010600030101010101" pitchFamily="2" charset="-122"/>
                   </a:defRPr>
                 </a:lvl7pPr>
@@ -526,7 +557,7 @@
                     <a:solidFill>
                       <a:schemeClr val="tx1"/>
                     </a:solidFill>
-                    <a:latin typeface="Tahoma" panose="020B0604030504040204" pitchFamily="34" charset="0"/>
+                    <a:latin typeface="Tahoma" panose="020B0804030504040204" pitchFamily="34" charset="0"/>
                     <a:ea typeface="宋体" panose="02010600030101010101" pitchFamily="2" charset="-122"/>
                   </a:defRPr>
                 </a:lvl8pPr>
@@ -541,7 +572,7 @@
                     <a:solidFill>
                       <a:schemeClr val="tx1"/>
                     </a:solidFill>
-                    <a:latin typeface="Tahoma" panose="020B0604030504040204" pitchFamily="34" charset="0"/>
+                    <a:latin typeface="Tahoma" panose="020B0804030504040204" pitchFamily="34" charset="0"/>
                     <a:ea typeface="宋体" panose="02010600030101010101" pitchFamily="2" charset="-122"/>
                   </a:defRPr>
                 </a:lvl9pPr>
@@ -605,7 +636,7 @@
                     <a:solidFill>
                       <a:schemeClr val="tx1"/>
                     </a:solidFill>
-                    <a:latin typeface="Tahoma" panose="020B0604030504040204" pitchFamily="34" charset="0"/>
+                    <a:latin typeface="Tahoma" panose="020B0804030504040204" pitchFamily="34" charset="0"/>
                     <a:ea typeface="宋体" panose="02010600030101010101" pitchFamily="2" charset="-122"/>
                   </a:defRPr>
                 </a:lvl1pPr>
@@ -614,7 +645,7 @@
                     <a:solidFill>
                       <a:schemeClr val="tx1"/>
                     </a:solidFill>
-                    <a:latin typeface="Tahoma" panose="020B0604030504040204" pitchFamily="34" charset="0"/>
+                    <a:latin typeface="Tahoma" panose="020B0804030504040204" pitchFamily="34" charset="0"/>
                     <a:ea typeface="宋体" panose="02010600030101010101" pitchFamily="2" charset="-122"/>
                   </a:defRPr>
                 </a:lvl2pPr>
@@ -623,7 +654,7 @@
                     <a:solidFill>
                       <a:schemeClr val="tx1"/>
                     </a:solidFill>
-                    <a:latin typeface="Tahoma" panose="020B0604030504040204" pitchFamily="34" charset="0"/>
+                    <a:latin typeface="Tahoma" panose="020B0804030504040204" pitchFamily="34" charset="0"/>
                     <a:ea typeface="宋体" panose="02010600030101010101" pitchFamily="2" charset="-122"/>
                   </a:defRPr>
                 </a:lvl3pPr>
@@ -632,7 +663,7 @@
                     <a:solidFill>
                       <a:schemeClr val="tx1"/>
                     </a:solidFill>
-                    <a:latin typeface="Tahoma" panose="020B0604030504040204" pitchFamily="34" charset="0"/>
+                    <a:latin typeface="Tahoma" panose="020B0804030504040204" pitchFamily="34" charset="0"/>
                     <a:ea typeface="宋体" panose="02010600030101010101" pitchFamily="2" charset="-122"/>
                   </a:defRPr>
                 </a:lvl4pPr>
@@ -641,7 +672,7 @@
                     <a:solidFill>
                       <a:schemeClr val="tx1"/>
                     </a:solidFill>
-                    <a:latin typeface="Tahoma" panose="020B0604030504040204" pitchFamily="34" charset="0"/>
+                    <a:latin typeface="Tahoma" panose="020B0804030504040204" pitchFamily="34" charset="0"/>
                     <a:ea typeface="宋体" panose="02010600030101010101" pitchFamily="2" charset="-122"/>
                   </a:defRPr>
                 </a:lvl5pPr>
@@ -656,7 +687,7 @@
                     <a:solidFill>
                       <a:schemeClr val="tx1"/>
                     </a:solidFill>
-                    <a:latin typeface="Tahoma" panose="020B0604030504040204" pitchFamily="34" charset="0"/>
+                    <a:latin typeface="Tahoma" panose="020B0804030504040204" pitchFamily="34" charset="0"/>
                     <a:ea typeface="宋体" panose="02010600030101010101" pitchFamily="2" charset="-122"/>
                   </a:defRPr>
                 </a:lvl6pPr>
@@ -671,7 +702,7 @@
                     <a:solidFill>
                       <a:schemeClr val="tx1"/>
                     </a:solidFill>
-                    <a:latin typeface="Tahoma" panose="020B0604030504040204" pitchFamily="34" charset="0"/>
+                    <a:latin typeface="Tahoma" panose="020B0804030504040204" pitchFamily="34" charset="0"/>
                     <a:ea typeface="宋体" panose="02010600030101010101" pitchFamily="2" charset="-122"/>
                   </a:defRPr>
                 </a:lvl7pPr>
@@ -686,7 +717,7 @@
                     <a:solidFill>
                       <a:schemeClr val="tx1"/>
                     </a:solidFill>
-                    <a:latin typeface="Tahoma" panose="020B0604030504040204" pitchFamily="34" charset="0"/>
+                    <a:latin typeface="Tahoma" panose="020B0804030504040204" pitchFamily="34" charset="0"/>
                     <a:ea typeface="宋体" panose="02010600030101010101" pitchFamily="2" charset="-122"/>
                   </a:defRPr>
                 </a:lvl8pPr>
@@ -701,7 +732,7 @@
                     <a:solidFill>
                       <a:schemeClr val="tx1"/>
                     </a:solidFill>
-                    <a:latin typeface="Tahoma" panose="020B0604030504040204" pitchFamily="34" charset="0"/>
+                    <a:latin typeface="Tahoma" panose="020B0804030504040204" pitchFamily="34" charset="0"/>
                     <a:ea typeface="宋体" panose="02010600030101010101" pitchFamily="2" charset="-122"/>
                   </a:defRPr>
                 </a:lvl9pPr>
@@ -772,7 +803,7 @@
                     <a:solidFill>
                       <a:schemeClr val="tx1"/>
                     </a:solidFill>
-                    <a:latin typeface="Tahoma" panose="020B0604030504040204" pitchFamily="34" charset="0"/>
+                    <a:latin typeface="Tahoma" panose="020B0804030504040204" pitchFamily="34" charset="0"/>
                     <a:ea typeface="宋体" panose="02010600030101010101" pitchFamily="2" charset="-122"/>
                   </a:defRPr>
                 </a:lvl1pPr>
@@ -781,7 +812,7 @@
                     <a:solidFill>
                       <a:schemeClr val="tx1"/>
                     </a:solidFill>
-                    <a:latin typeface="Tahoma" panose="020B0604030504040204" pitchFamily="34" charset="0"/>
+                    <a:latin typeface="Tahoma" panose="020B0804030504040204" pitchFamily="34" charset="0"/>
                     <a:ea typeface="宋体" panose="02010600030101010101" pitchFamily="2" charset="-122"/>
                   </a:defRPr>
                 </a:lvl2pPr>
@@ -790,7 +821,7 @@
                     <a:solidFill>
                       <a:schemeClr val="tx1"/>
                     </a:solidFill>
-                    <a:latin typeface="Tahoma" panose="020B0604030504040204" pitchFamily="34" charset="0"/>
+                    <a:latin typeface="Tahoma" panose="020B0804030504040204" pitchFamily="34" charset="0"/>
                     <a:ea typeface="宋体" panose="02010600030101010101" pitchFamily="2" charset="-122"/>
                   </a:defRPr>
                 </a:lvl3pPr>
@@ -799,7 +830,7 @@
                     <a:solidFill>
                       <a:schemeClr val="tx1"/>
                     </a:solidFill>
-                    <a:latin typeface="Tahoma" panose="020B0604030504040204" pitchFamily="34" charset="0"/>
+                    <a:latin typeface="Tahoma" panose="020B0804030504040204" pitchFamily="34" charset="0"/>
                     <a:ea typeface="宋体" panose="02010600030101010101" pitchFamily="2" charset="-122"/>
                   </a:defRPr>
                 </a:lvl4pPr>
@@ -808,7 +839,7 @@
                     <a:solidFill>
                       <a:schemeClr val="tx1"/>
                     </a:solidFill>
-                    <a:latin typeface="Tahoma" panose="020B0604030504040204" pitchFamily="34" charset="0"/>
+                    <a:latin typeface="Tahoma" panose="020B0804030504040204" pitchFamily="34" charset="0"/>
                     <a:ea typeface="宋体" panose="02010600030101010101" pitchFamily="2" charset="-122"/>
                   </a:defRPr>
                 </a:lvl5pPr>
@@ -823,7 +854,7 @@
                     <a:solidFill>
                       <a:schemeClr val="tx1"/>
                     </a:solidFill>
-                    <a:latin typeface="Tahoma" panose="020B0604030504040204" pitchFamily="34" charset="0"/>
+                    <a:latin typeface="Tahoma" panose="020B0804030504040204" pitchFamily="34" charset="0"/>
                     <a:ea typeface="宋体" panose="02010600030101010101" pitchFamily="2" charset="-122"/>
                   </a:defRPr>
                 </a:lvl6pPr>
@@ -838,7 +869,7 @@
                     <a:solidFill>
                       <a:schemeClr val="tx1"/>
                     </a:solidFill>
-                    <a:latin typeface="Tahoma" panose="020B0604030504040204" pitchFamily="34" charset="0"/>
+                    <a:latin typeface="Tahoma" panose="020B0804030504040204" pitchFamily="34" charset="0"/>
                     <a:ea typeface="宋体" panose="02010600030101010101" pitchFamily="2" charset="-122"/>
                   </a:defRPr>
                 </a:lvl7pPr>
@@ -853,7 +884,7 @@
                     <a:solidFill>
                       <a:schemeClr val="tx1"/>
                     </a:solidFill>
-                    <a:latin typeface="Tahoma" panose="020B0604030504040204" pitchFamily="34" charset="0"/>
+                    <a:latin typeface="Tahoma" panose="020B0804030504040204" pitchFamily="34" charset="0"/>
                     <a:ea typeface="宋体" panose="02010600030101010101" pitchFamily="2" charset="-122"/>
                   </a:defRPr>
                 </a:lvl8pPr>
@@ -868,7 +899,7 @@
                     <a:solidFill>
                       <a:schemeClr val="tx1"/>
                     </a:solidFill>
-                    <a:latin typeface="Tahoma" panose="020B0604030504040204" pitchFamily="34" charset="0"/>
+                    <a:latin typeface="Tahoma" panose="020B0804030504040204" pitchFamily="34" charset="0"/>
                     <a:ea typeface="宋体" panose="02010600030101010101" pitchFamily="2" charset="-122"/>
                   </a:defRPr>
                 </a:lvl9pPr>
@@ -932,7 +963,7 @@
                     <a:solidFill>
                       <a:schemeClr val="tx1"/>
                     </a:solidFill>
-                    <a:latin typeface="Tahoma" panose="020B0604030504040204" pitchFamily="34" charset="0"/>
+                    <a:latin typeface="Tahoma" panose="020B0804030504040204" pitchFamily="34" charset="0"/>
                     <a:ea typeface="宋体" panose="02010600030101010101" pitchFamily="2" charset="-122"/>
                   </a:defRPr>
                 </a:lvl1pPr>
@@ -941,7 +972,7 @@
                     <a:solidFill>
                       <a:schemeClr val="tx1"/>
                     </a:solidFill>
-                    <a:latin typeface="Tahoma" panose="020B0604030504040204" pitchFamily="34" charset="0"/>
+                    <a:latin typeface="Tahoma" panose="020B0804030504040204" pitchFamily="34" charset="0"/>
                     <a:ea typeface="宋体" panose="02010600030101010101" pitchFamily="2" charset="-122"/>
                   </a:defRPr>
                 </a:lvl2pPr>
@@ -950,7 +981,7 @@
                     <a:solidFill>
                       <a:schemeClr val="tx1"/>
                     </a:solidFill>
-                    <a:latin typeface="Tahoma" panose="020B0604030504040204" pitchFamily="34" charset="0"/>
+                    <a:latin typeface="Tahoma" panose="020B0804030504040204" pitchFamily="34" charset="0"/>
                     <a:ea typeface="宋体" panose="02010600030101010101" pitchFamily="2" charset="-122"/>
                   </a:defRPr>
                 </a:lvl3pPr>
@@ -959,7 +990,7 @@
                     <a:solidFill>
                       <a:schemeClr val="tx1"/>
                     </a:solidFill>
-                    <a:latin typeface="Tahoma" panose="020B0604030504040204" pitchFamily="34" charset="0"/>
+                    <a:latin typeface="Tahoma" panose="020B0804030504040204" pitchFamily="34" charset="0"/>
                     <a:ea typeface="宋体" panose="02010600030101010101" pitchFamily="2" charset="-122"/>
                   </a:defRPr>
                 </a:lvl4pPr>
@@ -968,7 +999,7 @@
                     <a:solidFill>
                       <a:schemeClr val="tx1"/>
                     </a:solidFill>
-                    <a:latin typeface="Tahoma" panose="020B0604030504040204" pitchFamily="34" charset="0"/>
+                    <a:latin typeface="Tahoma" panose="020B0804030504040204" pitchFamily="34" charset="0"/>
                     <a:ea typeface="宋体" panose="02010600030101010101" pitchFamily="2" charset="-122"/>
                   </a:defRPr>
                 </a:lvl5pPr>
@@ -983,7 +1014,7 @@
                     <a:solidFill>
                       <a:schemeClr val="tx1"/>
                     </a:solidFill>
-                    <a:latin typeface="Tahoma" panose="020B0604030504040204" pitchFamily="34" charset="0"/>
+                    <a:latin typeface="Tahoma" panose="020B0804030504040204" pitchFamily="34" charset="0"/>
                     <a:ea typeface="宋体" panose="02010600030101010101" pitchFamily="2" charset="-122"/>
                   </a:defRPr>
                 </a:lvl6pPr>
@@ -998,7 +1029,7 @@
                     <a:solidFill>
                       <a:schemeClr val="tx1"/>
                     </a:solidFill>
-                    <a:latin typeface="Tahoma" panose="020B0604030504040204" pitchFamily="34" charset="0"/>
+                    <a:latin typeface="Tahoma" panose="020B0804030504040204" pitchFamily="34" charset="0"/>
                     <a:ea typeface="宋体" panose="02010600030101010101" pitchFamily="2" charset="-122"/>
                   </a:defRPr>
                 </a:lvl7pPr>
@@ -1013,7 +1044,7 @@
                     <a:solidFill>
                       <a:schemeClr val="tx1"/>
                     </a:solidFill>
-                    <a:latin typeface="Tahoma" panose="020B0604030504040204" pitchFamily="34" charset="0"/>
+                    <a:latin typeface="Tahoma" panose="020B0804030504040204" pitchFamily="34" charset="0"/>
                     <a:ea typeface="宋体" panose="02010600030101010101" pitchFamily="2" charset="-122"/>
                   </a:defRPr>
                 </a:lvl8pPr>
@@ -1028,7 +1059,7 @@
                     <a:solidFill>
                       <a:schemeClr val="tx1"/>
                     </a:solidFill>
-                    <a:latin typeface="Tahoma" panose="020B0604030504040204" pitchFamily="34" charset="0"/>
+                    <a:latin typeface="Tahoma" panose="020B0804030504040204" pitchFamily="34" charset="0"/>
                     <a:ea typeface="宋体" panose="02010600030101010101" pitchFamily="2" charset="-122"/>
                   </a:defRPr>
                 </a:lvl9pPr>
@@ -1093,7 +1124,7 @@
                   <a:solidFill>
                     <a:schemeClr val="tx1"/>
                   </a:solidFill>
-                  <a:latin typeface="Tahoma" panose="020B0604030504040204" pitchFamily="34" charset="0"/>
+                  <a:latin typeface="Tahoma" panose="020B0804030504040204" pitchFamily="34" charset="0"/>
                   <a:ea typeface="宋体" panose="02010600030101010101" pitchFamily="2" charset="-122"/>
                 </a:defRPr>
               </a:lvl1pPr>
@@ -1102,7 +1133,7 @@
                   <a:solidFill>
                     <a:schemeClr val="tx1"/>
                   </a:solidFill>
-                  <a:latin typeface="Tahoma" panose="020B0604030504040204" pitchFamily="34" charset="0"/>
+                  <a:latin typeface="Tahoma" panose="020B0804030504040204" pitchFamily="34" charset="0"/>
                   <a:ea typeface="宋体" panose="02010600030101010101" pitchFamily="2" charset="-122"/>
                 </a:defRPr>
               </a:lvl2pPr>
@@ -1111,7 +1142,7 @@
                   <a:solidFill>
                     <a:schemeClr val="tx1"/>
                   </a:solidFill>
-                  <a:latin typeface="Tahoma" panose="020B0604030504040204" pitchFamily="34" charset="0"/>
+                  <a:latin typeface="Tahoma" panose="020B0804030504040204" pitchFamily="34" charset="0"/>
                   <a:ea typeface="宋体" panose="02010600030101010101" pitchFamily="2" charset="-122"/>
                 </a:defRPr>
               </a:lvl3pPr>
@@ -1120,7 +1151,7 @@
                   <a:solidFill>
                     <a:schemeClr val="tx1"/>
                   </a:solidFill>
-                  <a:latin typeface="Tahoma" panose="020B0604030504040204" pitchFamily="34" charset="0"/>
+                  <a:latin typeface="Tahoma" panose="020B0804030504040204" pitchFamily="34" charset="0"/>
                   <a:ea typeface="宋体" panose="02010600030101010101" pitchFamily="2" charset="-122"/>
                 </a:defRPr>
               </a:lvl4pPr>
@@ -1129,7 +1160,7 @@
                   <a:solidFill>
                     <a:schemeClr val="tx1"/>
                   </a:solidFill>
-                  <a:latin typeface="Tahoma" panose="020B0604030504040204" pitchFamily="34" charset="0"/>
+                  <a:latin typeface="Tahoma" panose="020B0804030504040204" pitchFamily="34" charset="0"/>
                   <a:ea typeface="宋体" panose="02010600030101010101" pitchFamily="2" charset="-122"/>
                 </a:defRPr>
               </a:lvl5pPr>
@@ -1144,7 +1175,7 @@
                   <a:solidFill>
                     <a:schemeClr val="tx1"/>
                   </a:solidFill>
-                  <a:latin typeface="Tahoma" panose="020B0604030504040204" pitchFamily="34" charset="0"/>
+                  <a:latin typeface="Tahoma" panose="020B0804030504040204" pitchFamily="34" charset="0"/>
                   <a:ea typeface="宋体" panose="02010600030101010101" pitchFamily="2" charset="-122"/>
                 </a:defRPr>
               </a:lvl6pPr>
@@ -1159,7 +1190,7 @@
                   <a:solidFill>
                     <a:schemeClr val="tx1"/>
                   </a:solidFill>
-                  <a:latin typeface="Tahoma" panose="020B0604030504040204" pitchFamily="34" charset="0"/>
+                  <a:latin typeface="Tahoma" panose="020B0804030504040204" pitchFamily="34" charset="0"/>
                   <a:ea typeface="宋体" panose="02010600030101010101" pitchFamily="2" charset="-122"/>
                 </a:defRPr>
               </a:lvl7pPr>
@@ -1174,7 +1205,7 @@
                   <a:solidFill>
                     <a:schemeClr val="tx1"/>
                   </a:solidFill>
-                  <a:latin typeface="Tahoma" panose="020B0604030504040204" pitchFamily="34" charset="0"/>
+                  <a:latin typeface="Tahoma" panose="020B0804030504040204" pitchFamily="34" charset="0"/>
                   <a:ea typeface="宋体" panose="02010600030101010101" pitchFamily="2" charset="-122"/>
                 </a:defRPr>
               </a:lvl8pPr>
@@ -1189,7 +1220,7 @@
                   <a:solidFill>
                     <a:schemeClr val="tx1"/>
                   </a:solidFill>
-                  <a:latin typeface="Tahoma" panose="020B0604030504040204" pitchFamily="34" charset="0"/>
+                  <a:latin typeface="Tahoma" panose="020B0804030504040204" pitchFamily="34" charset="0"/>
                   <a:ea typeface="宋体" panose="02010600030101010101" pitchFamily="2" charset="-122"/>
                 </a:defRPr>
               </a:lvl9pPr>
@@ -1245,7 +1276,7 @@
                   <a:solidFill>
                     <a:schemeClr val="tx1"/>
                   </a:solidFill>
-                  <a:latin typeface="Tahoma" panose="020B0604030504040204" pitchFamily="34" charset="0"/>
+                  <a:latin typeface="Tahoma" panose="020B0804030504040204" pitchFamily="34" charset="0"/>
                   <a:ea typeface="宋体" panose="02010600030101010101" pitchFamily="2" charset="-122"/>
                 </a:defRPr>
               </a:lvl1pPr>
@@ -1254,7 +1285,7 @@
                   <a:solidFill>
                     <a:schemeClr val="tx1"/>
                   </a:solidFill>
-                  <a:latin typeface="Tahoma" panose="020B0604030504040204" pitchFamily="34" charset="0"/>
+                  <a:latin typeface="Tahoma" panose="020B0804030504040204" pitchFamily="34" charset="0"/>
                   <a:ea typeface="宋体" panose="02010600030101010101" pitchFamily="2" charset="-122"/>
                 </a:defRPr>
               </a:lvl2pPr>
@@ -1263,7 +1294,7 @@
                   <a:solidFill>
                     <a:schemeClr val="tx1"/>
                   </a:solidFill>
-                  <a:latin typeface="Tahoma" panose="020B0604030504040204" pitchFamily="34" charset="0"/>
+                  <a:latin typeface="Tahoma" panose="020B0804030504040204" pitchFamily="34" charset="0"/>
                   <a:ea typeface="宋体" panose="02010600030101010101" pitchFamily="2" charset="-122"/>
                 </a:defRPr>
               </a:lvl3pPr>
@@ -1272,7 +1303,7 @@
                   <a:solidFill>
                     <a:schemeClr val="tx1"/>
                   </a:solidFill>
-                  <a:latin typeface="Tahoma" panose="020B0604030504040204" pitchFamily="34" charset="0"/>
+                  <a:latin typeface="Tahoma" panose="020B0804030504040204" pitchFamily="34" charset="0"/>
                   <a:ea typeface="宋体" panose="02010600030101010101" pitchFamily="2" charset="-122"/>
                 </a:defRPr>
               </a:lvl4pPr>
@@ -1281,7 +1312,7 @@
                   <a:solidFill>
                     <a:schemeClr val="tx1"/>
                   </a:solidFill>
-                  <a:latin typeface="Tahoma" panose="020B0604030504040204" pitchFamily="34" charset="0"/>
+                  <a:latin typeface="Tahoma" panose="020B0804030504040204" pitchFamily="34" charset="0"/>
                   <a:ea typeface="宋体" panose="02010600030101010101" pitchFamily="2" charset="-122"/>
                 </a:defRPr>
               </a:lvl5pPr>
@@ -1296,7 +1327,7 @@
                   <a:solidFill>
                     <a:schemeClr val="tx1"/>
                   </a:solidFill>
-                  <a:latin typeface="Tahoma" panose="020B0604030504040204" pitchFamily="34" charset="0"/>
+                  <a:latin typeface="Tahoma" panose="020B0804030504040204" pitchFamily="34" charset="0"/>
                   <a:ea typeface="宋体" panose="02010600030101010101" pitchFamily="2" charset="-122"/>
                 </a:defRPr>
               </a:lvl6pPr>
@@ -1311,7 +1342,7 @@
                   <a:solidFill>
                     <a:schemeClr val="tx1"/>
                   </a:solidFill>
-                  <a:latin typeface="Tahoma" panose="020B0604030504040204" pitchFamily="34" charset="0"/>
+                  <a:latin typeface="Tahoma" panose="020B0804030504040204" pitchFamily="34" charset="0"/>
                   <a:ea typeface="宋体" panose="02010600030101010101" pitchFamily="2" charset="-122"/>
                 </a:defRPr>
               </a:lvl7pPr>
@@ -1326,7 +1357,7 @@
                   <a:solidFill>
                     <a:schemeClr val="tx1"/>
                   </a:solidFill>
-                  <a:latin typeface="Tahoma" panose="020B0604030504040204" pitchFamily="34" charset="0"/>
+                  <a:latin typeface="Tahoma" panose="020B0804030504040204" pitchFamily="34" charset="0"/>
                   <a:ea typeface="宋体" panose="02010600030101010101" pitchFamily="2" charset="-122"/>
                 </a:defRPr>
               </a:lvl8pPr>
@@ -1341,7 +1372,7 @@
                   <a:solidFill>
                     <a:schemeClr val="tx1"/>
                   </a:solidFill>
-                  <a:latin typeface="Tahoma" panose="020B0604030504040204" pitchFamily="34" charset="0"/>
+                  <a:latin typeface="Tahoma" panose="020B0804030504040204" pitchFamily="34" charset="0"/>
                   <a:ea typeface="宋体" panose="02010600030101010101" pitchFamily="2" charset="-122"/>
                 </a:defRPr>
               </a:lvl9pPr>
@@ -1405,7 +1436,7 @@
                   <a:solidFill>
                     <a:schemeClr val="tx1"/>
                   </a:solidFill>
-                  <a:latin typeface="Tahoma" panose="020B0604030504040204" pitchFamily="34" charset="0"/>
+                  <a:latin typeface="Tahoma" panose="020B0804030504040204" pitchFamily="34" charset="0"/>
                   <a:ea typeface="宋体" panose="02010600030101010101" pitchFamily="2" charset="-122"/>
                 </a:defRPr>
               </a:lvl1pPr>
@@ -1414,7 +1445,7 @@
                   <a:solidFill>
                     <a:schemeClr val="tx1"/>
                   </a:solidFill>
-                  <a:latin typeface="Tahoma" panose="020B0604030504040204" pitchFamily="34" charset="0"/>
+                  <a:latin typeface="Tahoma" panose="020B0804030504040204" pitchFamily="34" charset="0"/>
                   <a:ea typeface="宋体" panose="02010600030101010101" pitchFamily="2" charset="-122"/>
                 </a:defRPr>
               </a:lvl2pPr>
@@ -1423,7 +1454,7 @@
                   <a:solidFill>
                     <a:schemeClr val="tx1"/>
                   </a:solidFill>
-                  <a:latin typeface="Tahoma" panose="020B0604030504040204" pitchFamily="34" charset="0"/>
+                  <a:latin typeface="Tahoma" panose="020B0804030504040204" pitchFamily="34" charset="0"/>
                   <a:ea typeface="宋体" panose="02010600030101010101" pitchFamily="2" charset="-122"/>
                 </a:defRPr>
               </a:lvl3pPr>
@@ -1432,7 +1463,7 @@
                   <a:solidFill>
                     <a:schemeClr val="tx1"/>
                   </a:solidFill>
-                  <a:latin typeface="Tahoma" panose="020B0604030504040204" pitchFamily="34" charset="0"/>
+                  <a:latin typeface="Tahoma" panose="020B0804030504040204" pitchFamily="34" charset="0"/>
                   <a:ea typeface="宋体" panose="02010600030101010101" pitchFamily="2" charset="-122"/>
                 </a:defRPr>
               </a:lvl4pPr>
@@ -1441,7 +1472,7 @@
                   <a:solidFill>
                     <a:schemeClr val="tx1"/>
                   </a:solidFill>
-                  <a:latin typeface="Tahoma" panose="020B0604030504040204" pitchFamily="34" charset="0"/>
+                  <a:latin typeface="Tahoma" panose="020B0804030504040204" pitchFamily="34" charset="0"/>
                   <a:ea typeface="宋体" panose="02010600030101010101" pitchFamily="2" charset="-122"/>
                 </a:defRPr>
               </a:lvl5pPr>
@@ -1456,7 +1487,7 @@
                   <a:solidFill>
                     <a:schemeClr val="tx1"/>
                   </a:solidFill>
-                  <a:latin typeface="Tahoma" panose="020B0604030504040204" pitchFamily="34" charset="0"/>
+                  <a:latin typeface="Tahoma" panose="020B0804030504040204" pitchFamily="34" charset="0"/>
                   <a:ea typeface="宋体" panose="02010600030101010101" pitchFamily="2" charset="-122"/>
                 </a:defRPr>
               </a:lvl6pPr>
@@ -1471,7 +1502,7 @@
                   <a:solidFill>
                     <a:schemeClr val="tx1"/>
                   </a:solidFill>
-                  <a:latin typeface="Tahoma" panose="020B0604030504040204" pitchFamily="34" charset="0"/>
+                  <a:latin typeface="Tahoma" panose="020B0804030504040204" pitchFamily="34" charset="0"/>
                   <a:ea typeface="宋体" panose="02010600030101010101" pitchFamily="2" charset="-122"/>
                 </a:defRPr>
               </a:lvl7pPr>
@@ -1486,7 +1517,7 @@
                   <a:solidFill>
                     <a:schemeClr val="tx1"/>
                   </a:solidFill>
-                  <a:latin typeface="Tahoma" panose="020B0604030504040204" pitchFamily="34" charset="0"/>
+                  <a:latin typeface="Tahoma" panose="020B0804030504040204" pitchFamily="34" charset="0"/>
                   <a:ea typeface="宋体" panose="02010600030101010101" pitchFamily="2" charset="-122"/>
                 </a:defRPr>
               </a:lvl8pPr>
@@ -1501,7 +1532,7 @@
                   <a:solidFill>
                     <a:schemeClr val="tx1"/>
                   </a:solidFill>
-                  <a:latin typeface="Tahoma" panose="020B0604030504040204" pitchFamily="34" charset="0"/>
+                  <a:latin typeface="Tahoma" panose="020B0804030504040204" pitchFamily="34" charset="0"/>
                   <a:ea typeface="宋体" panose="02010600030101010101" pitchFamily="2" charset="-122"/>
                 </a:defRPr>
               </a:lvl9pPr>
@@ -1543,7 +1574,6 @@
               <a:rPr lang="zh-CN" altLang="en-US"/>
               <a:t>单击此处编辑母版标题样式</a:t>
             </a:r>
-            <a:endParaRPr lang="zh-CN" altLang="en-US"/>
           </a:p>
         </p:txBody>
       </p:sp>
@@ -1577,7 +1607,6 @@
               <a:rPr lang="zh-CN" altLang="en-US"/>
               <a:t>单击此处编辑母版副标题样式</a:t>
             </a:r>
-            <a:endParaRPr lang="zh-CN" altLang="en-US"/>
           </a:p>
         </p:txBody>
       </p:sp>
@@ -1684,6 +1713,7 @@
             </a:pPr>
             <a:fld id="{A56CEFF4-1CB8-C149-9E1E-18EC59564F5C}" type="slidenum">
               <a:rPr lang="en-US" altLang="zh-CN"/>
+              <a:t>‹#›</a:t>
             </a:fld>
             <a:endParaRPr lang="en-US" altLang="zh-CN"/>
           </a:p>
@@ -1733,7 +1763,6 @@
               <a:rPr lang="zh-CN" altLang="en-US"/>
               <a:t>单击此处编辑母版标题样式</a:t>
             </a:r>
-            <a:endParaRPr lang="zh-CN" altLang="en-US"/>
           </a:p>
         </p:txBody>
       </p:sp>
@@ -1757,7 +1786,6 @@
               <a:rPr lang="zh-CN" altLang="en-US"/>
               <a:t>单击此处编辑母版文本样式</a:t>
             </a:r>
-            <a:endParaRPr lang="zh-CN" altLang="en-US"/>
           </a:p>
           <a:p>
             <a:pPr lvl="1"/>
@@ -1765,7 +1793,6 @@
               <a:rPr lang="zh-CN" altLang="en-US"/>
               <a:t>第二级</a:t>
             </a:r>
-            <a:endParaRPr lang="zh-CN" altLang="en-US"/>
           </a:p>
           <a:p>
             <a:pPr lvl="2"/>
@@ -1773,7 +1800,6 @@
               <a:rPr lang="zh-CN" altLang="en-US"/>
               <a:t>第三级</a:t>
             </a:r>
-            <a:endParaRPr lang="zh-CN" altLang="en-US"/>
           </a:p>
           <a:p>
             <a:pPr lvl="3"/>
@@ -1781,7 +1807,6 @@
               <a:rPr lang="zh-CN" altLang="en-US"/>
               <a:t>第四级</a:t>
             </a:r>
-            <a:endParaRPr lang="zh-CN" altLang="en-US"/>
           </a:p>
           <a:p>
             <a:pPr lvl="4"/>
@@ -1789,7 +1814,6 @@
               <a:rPr lang="zh-CN" altLang="en-US"/>
               <a:t>第五级</a:t>
             </a:r>
-            <a:endParaRPr lang="zh-CN" altLang="en-US"/>
           </a:p>
         </p:txBody>
       </p:sp>
@@ -1869,6 +1893,7 @@
             </a:pPr>
             <a:fld id="{0CCC555C-B874-8940-8475-A51856F03562}" type="slidenum">
               <a:rPr lang="en-US" altLang="zh-CN"/>
+              <a:t>‹#›</a:t>
             </a:fld>
             <a:endParaRPr lang="en-US" altLang="zh-CN"/>
           </a:p>
@@ -1923,7 +1948,6 @@
               <a:rPr lang="zh-CN" altLang="en-US"/>
               <a:t>单击此处编辑母版标题样式</a:t>
             </a:r>
-            <a:endParaRPr lang="zh-CN" altLang="en-US"/>
           </a:p>
         </p:txBody>
       </p:sp>
@@ -1952,7 +1976,6 @@
               <a:rPr lang="zh-CN" altLang="en-US"/>
               <a:t>单击此处编辑母版文本样式</a:t>
             </a:r>
-            <a:endParaRPr lang="zh-CN" altLang="en-US"/>
           </a:p>
           <a:p>
             <a:pPr lvl="1"/>
@@ -1960,7 +1983,6 @@
               <a:rPr lang="zh-CN" altLang="en-US"/>
               <a:t>第二级</a:t>
             </a:r>
-            <a:endParaRPr lang="zh-CN" altLang="en-US"/>
           </a:p>
           <a:p>
             <a:pPr lvl="2"/>
@@ -1968,7 +1990,6 @@
               <a:rPr lang="zh-CN" altLang="en-US"/>
               <a:t>第三级</a:t>
             </a:r>
-            <a:endParaRPr lang="zh-CN" altLang="en-US"/>
           </a:p>
           <a:p>
             <a:pPr lvl="3"/>
@@ -1976,7 +1997,6 @@
               <a:rPr lang="zh-CN" altLang="en-US"/>
               <a:t>第四级</a:t>
             </a:r>
-            <a:endParaRPr lang="zh-CN" altLang="en-US"/>
           </a:p>
           <a:p>
             <a:pPr lvl="4"/>
@@ -1984,7 +2004,6 @@
               <a:rPr lang="zh-CN" altLang="en-US"/>
               <a:t>第五级</a:t>
             </a:r>
-            <a:endParaRPr lang="zh-CN" altLang="en-US"/>
           </a:p>
         </p:txBody>
       </p:sp>
@@ -2064,6 +2083,7 @@
             </a:pPr>
             <a:fld id="{0F322266-2377-B243-8ED9-F9592BF45FFD}" type="slidenum">
               <a:rPr lang="en-US" altLang="zh-CN"/>
+              <a:t>‹#›</a:t>
             </a:fld>
             <a:endParaRPr lang="en-US" altLang="zh-CN"/>
           </a:p>
@@ -2113,7 +2133,6 @@
               <a:rPr lang="zh-CN" altLang="en-US"/>
               <a:t>单击此处编辑母版标题样式</a:t>
             </a:r>
-            <a:endParaRPr lang="zh-CN" altLang="en-US"/>
           </a:p>
         </p:txBody>
       </p:sp>
@@ -2137,7 +2156,6 @@
               <a:rPr lang="zh-CN" altLang="en-US"/>
               <a:t>单击此处编辑母版文本样式</a:t>
             </a:r>
-            <a:endParaRPr lang="zh-CN" altLang="en-US"/>
           </a:p>
           <a:p>
             <a:pPr lvl="1"/>
@@ -2145,7 +2163,6 @@
               <a:rPr lang="zh-CN" altLang="en-US"/>
               <a:t>第二级</a:t>
             </a:r>
-            <a:endParaRPr lang="zh-CN" altLang="en-US"/>
           </a:p>
           <a:p>
             <a:pPr lvl="2"/>
@@ -2153,7 +2170,6 @@
               <a:rPr lang="zh-CN" altLang="en-US"/>
               <a:t>第三级</a:t>
             </a:r>
-            <a:endParaRPr lang="zh-CN" altLang="en-US"/>
           </a:p>
           <a:p>
             <a:pPr lvl="3"/>
@@ -2161,7 +2177,6 @@
               <a:rPr lang="zh-CN" altLang="en-US"/>
               <a:t>第四级</a:t>
             </a:r>
-            <a:endParaRPr lang="zh-CN" altLang="en-US"/>
           </a:p>
           <a:p>
             <a:pPr lvl="4"/>
@@ -2169,7 +2184,6 @@
               <a:rPr lang="zh-CN" altLang="en-US"/>
               <a:t>第五级</a:t>
             </a:r>
-            <a:endParaRPr lang="zh-CN" altLang="en-US"/>
           </a:p>
         </p:txBody>
       </p:sp>
@@ -2249,6 +2263,7 @@
             </a:pPr>
             <a:fld id="{8BF89D18-BAB0-6C47-906A-6803D7238301}" type="slidenum">
               <a:rPr lang="en-US" altLang="zh-CN"/>
+              <a:t>‹#›</a:t>
             </a:fld>
             <a:endParaRPr lang="en-US" altLang="zh-CN"/>
           </a:p>
@@ -2307,7 +2322,6 @@
               <a:rPr lang="zh-CN" altLang="en-US"/>
               <a:t>单击此处编辑母版标题样式</a:t>
             </a:r>
-            <a:endParaRPr lang="zh-CN" altLang="en-US"/>
           </a:p>
         </p:txBody>
       </p:sp>
@@ -2373,7 +2387,6 @@
               <a:rPr lang="zh-CN" altLang="en-US"/>
               <a:t>单击此处编辑母版文本样式</a:t>
             </a:r>
-            <a:endParaRPr lang="zh-CN" altLang="en-US"/>
           </a:p>
         </p:txBody>
       </p:sp>
@@ -2453,6 +2466,7 @@
             </a:pPr>
             <a:fld id="{D2FF17B6-86A0-4C42-99A9-A4E3CAB68D98}" type="slidenum">
               <a:rPr lang="en-US" altLang="zh-CN"/>
+              <a:t>‹#›</a:t>
             </a:fld>
             <a:endParaRPr lang="en-US" altLang="zh-CN"/>
           </a:p>
@@ -2502,7 +2516,6 @@
               <a:rPr lang="zh-CN" altLang="en-US"/>
               <a:t>单击此处编辑母版标题样式</a:t>
             </a:r>
-            <a:endParaRPr lang="zh-CN" altLang="en-US"/>
           </a:p>
         </p:txBody>
       </p:sp>
@@ -2559,7 +2572,6 @@
               <a:rPr lang="zh-CN" altLang="en-US"/>
               <a:t>单击此处编辑母版文本样式</a:t>
             </a:r>
-            <a:endParaRPr lang="zh-CN" altLang="en-US"/>
           </a:p>
           <a:p>
             <a:pPr lvl="1"/>
@@ -2567,7 +2579,6 @@
               <a:rPr lang="zh-CN" altLang="en-US"/>
               <a:t>第二级</a:t>
             </a:r>
-            <a:endParaRPr lang="zh-CN" altLang="en-US"/>
           </a:p>
           <a:p>
             <a:pPr lvl="2"/>
@@ -2575,7 +2586,6 @@
               <a:rPr lang="zh-CN" altLang="en-US"/>
               <a:t>第三级</a:t>
             </a:r>
-            <a:endParaRPr lang="zh-CN" altLang="en-US"/>
           </a:p>
           <a:p>
             <a:pPr lvl="3"/>
@@ -2583,7 +2593,6 @@
               <a:rPr lang="zh-CN" altLang="en-US"/>
               <a:t>第四级</a:t>
             </a:r>
-            <a:endParaRPr lang="zh-CN" altLang="en-US"/>
           </a:p>
           <a:p>
             <a:pPr lvl="4"/>
@@ -2591,7 +2600,6 @@
               <a:rPr lang="zh-CN" altLang="en-US"/>
               <a:t>第五级</a:t>
             </a:r>
-            <a:endParaRPr lang="zh-CN" altLang="en-US"/>
           </a:p>
         </p:txBody>
       </p:sp>
@@ -2648,7 +2656,6 @@
               <a:rPr lang="zh-CN" altLang="en-US"/>
               <a:t>单击此处编辑母版文本样式</a:t>
             </a:r>
-            <a:endParaRPr lang="zh-CN" altLang="en-US"/>
           </a:p>
           <a:p>
             <a:pPr lvl="1"/>
@@ -2656,7 +2663,6 @@
               <a:rPr lang="zh-CN" altLang="en-US"/>
               <a:t>第二级</a:t>
             </a:r>
-            <a:endParaRPr lang="zh-CN" altLang="en-US"/>
           </a:p>
           <a:p>
             <a:pPr lvl="2"/>
@@ -2664,7 +2670,6 @@
               <a:rPr lang="zh-CN" altLang="en-US"/>
               <a:t>第三级</a:t>
             </a:r>
-            <a:endParaRPr lang="zh-CN" altLang="en-US"/>
           </a:p>
           <a:p>
             <a:pPr lvl="3"/>
@@ -2672,7 +2677,6 @@
               <a:rPr lang="zh-CN" altLang="en-US"/>
               <a:t>第四级</a:t>
             </a:r>
-            <a:endParaRPr lang="zh-CN" altLang="en-US"/>
           </a:p>
           <a:p>
             <a:pPr lvl="4"/>
@@ -2680,7 +2684,6 @@
               <a:rPr lang="zh-CN" altLang="en-US"/>
               <a:t>第五级</a:t>
             </a:r>
-            <a:endParaRPr lang="zh-CN" altLang="en-US"/>
           </a:p>
         </p:txBody>
       </p:sp>
@@ -2760,6 +2763,7 @@
             </a:pPr>
             <a:fld id="{E0D6422D-5A0F-BE4E-9759-D8CEC74FA342}" type="slidenum">
               <a:rPr lang="en-US" altLang="zh-CN"/>
+              <a:t>‹#›</a:t>
             </a:fld>
             <a:endParaRPr lang="en-US" altLang="zh-CN"/>
           </a:p>
@@ -2818,7 +2822,6 @@
               <a:rPr lang="zh-CN" altLang="en-US"/>
               <a:t>单击此处编辑母版标题样式</a:t>
             </a:r>
-            <a:endParaRPr lang="zh-CN" altLang="en-US"/>
           </a:p>
         </p:txBody>
       </p:sp>
@@ -2884,7 +2887,6 @@
               <a:rPr lang="zh-CN" altLang="en-US"/>
               <a:t>单击此处编辑母版文本样式</a:t>
             </a:r>
-            <a:endParaRPr lang="zh-CN" altLang="en-US"/>
           </a:p>
         </p:txBody>
       </p:sp>
@@ -2941,7 +2943,6 @@
               <a:rPr lang="zh-CN" altLang="en-US"/>
               <a:t>单击此处编辑母版文本样式</a:t>
             </a:r>
-            <a:endParaRPr lang="zh-CN" altLang="en-US"/>
           </a:p>
           <a:p>
             <a:pPr lvl="1"/>
@@ -2949,7 +2950,6 @@
               <a:rPr lang="zh-CN" altLang="en-US"/>
               <a:t>第二级</a:t>
             </a:r>
-            <a:endParaRPr lang="zh-CN" altLang="en-US"/>
           </a:p>
           <a:p>
             <a:pPr lvl="2"/>
@@ -2957,7 +2957,6 @@
               <a:rPr lang="zh-CN" altLang="en-US"/>
               <a:t>第三级</a:t>
             </a:r>
-            <a:endParaRPr lang="zh-CN" altLang="en-US"/>
           </a:p>
           <a:p>
             <a:pPr lvl="3"/>
@@ -2965,7 +2964,6 @@
               <a:rPr lang="zh-CN" altLang="en-US"/>
               <a:t>第四级</a:t>
             </a:r>
-            <a:endParaRPr lang="zh-CN" altLang="en-US"/>
           </a:p>
           <a:p>
             <a:pPr lvl="4"/>
@@ -2973,7 +2971,6 @@
               <a:rPr lang="zh-CN" altLang="en-US"/>
               <a:t>第五级</a:t>
             </a:r>
-            <a:endParaRPr lang="zh-CN" altLang="en-US"/>
           </a:p>
         </p:txBody>
       </p:sp>
@@ -3039,7 +3036,6 @@
               <a:rPr lang="zh-CN" altLang="en-US"/>
               <a:t>单击此处编辑母版文本样式</a:t>
             </a:r>
-            <a:endParaRPr lang="zh-CN" altLang="en-US"/>
           </a:p>
         </p:txBody>
       </p:sp>
@@ -3096,7 +3092,6 @@
               <a:rPr lang="zh-CN" altLang="en-US"/>
               <a:t>单击此处编辑母版文本样式</a:t>
             </a:r>
-            <a:endParaRPr lang="zh-CN" altLang="en-US"/>
           </a:p>
           <a:p>
             <a:pPr lvl="1"/>
@@ -3104,7 +3099,6 @@
               <a:rPr lang="zh-CN" altLang="en-US"/>
               <a:t>第二级</a:t>
             </a:r>
-            <a:endParaRPr lang="zh-CN" altLang="en-US"/>
           </a:p>
           <a:p>
             <a:pPr lvl="2"/>
@@ -3112,7 +3106,6 @@
               <a:rPr lang="zh-CN" altLang="en-US"/>
               <a:t>第三级</a:t>
             </a:r>
-            <a:endParaRPr lang="zh-CN" altLang="en-US"/>
           </a:p>
           <a:p>
             <a:pPr lvl="3"/>
@@ -3120,7 +3113,6 @@
               <a:rPr lang="zh-CN" altLang="en-US"/>
               <a:t>第四级</a:t>
             </a:r>
-            <a:endParaRPr lang="zh-CN" altLang="en-US"/>
           </a:p>
           <a:p>
             <a:pPr lvl="4"/>
@@ -3128,7 +3120,6 @@
               <a:rPr lang="zh-CN" altLang="en-US"/>
               <a:t>第五级</a:t>
             </a:r>
-            <a:endParaRPr lang="zh-CN" altLang="en-US"/>
           </a:p>
         </p:txBody>
       </p:sp>
@@ -3208,6 +3199,7 @@
             </a:pPr>
             <a:fld id="{FBB9D37B-BEB9-8D4F-829B-2F65E753B740}" type="slidenum">
               <a:rPr lang="en-US" altLang="zh-CN"/>
+              <a:t>‹#›</a:t>
             </a:fld>
             <a:endParaRPr lang="en-US" altLang="zh-CN"/>
           </a:p>
@@ -3257,7 +3249,6 @@
               <a:rPr lang="zh-CN" altLang="en-US"/>
               <a:t>单击此处编辑母版标题样式</a:t>
             </a:r>
-            <a:endParaRPr lang="zh-CN" altLang="en-US"/>
           </a:p>
         </p:txBody>
       </p:sp>
@@ -3337,6 +3328,7 @@
             </a:pPr>
             <a:fld id="{F846D314-0784-554C-B36C-07F3B78CFC79}" type="slidenum">
               <a:rPr lang="en-US" altLang="zh-CN"/>
+              <a:t>‹#›</a:t>
             </a:fld>
             <a:endParaRPr lang="en-US" altLang="zh-CN"/>
           </a:p>
@@ -3443,6 +3435,7 @@
             </a:pPr>
             <a:fld id="{E295C386-1567-094D-8307-0C5FCCC0E3A8}" type="slidenum">
               <a:rPr lang="en-US" altLang="zh-CN"/>
+              <a:t>‹#›</a:t>
             </a:fld>
             <a:endParaRPr lang="en-US" altLang="zh-CN"/>
           </a:p>
@@ -3501,7 +3494,6 @@
               <a:rPr lang="zh-CN" altLang="en-US"/>
               <a:t>单击此处编辑母版标题样式</a:t>
             </a:r>
-            <a:endParaRPr lang="zh-CN" altLang="en-US"/>
           </a:p>
         </p:txBody>
       </p:sp>
@@ -3558,7 +3550,6 @@
               <a:rPr lang="zh-CN" altLang="en-US"/>
               <a:t>单击此处编辑母版文本样式</a:t>
             </a:r>
-            <a:endParaRPr lang="zh-CN" altLang="en-US"/>
           </a:p>
           <a:p>
             <a:pPr lvl="1"/>
@@ -3566,7 +3557,6 @@
               <a:rPr lang="zh-CN" altLang="en-US"/>
               <a:t>第二级</a:t>
             </a:r>
-            <a:endParaRPr lang="zh-CN" altLang="en-US"/>
           </a:p>
           <a:p>
             <a:pPr lvl="2"/>
@@ -3574,7 +3564,6 @@
               <a:rPr lang="zh-CN" altLang="en-US"/>
               <a:t>第三级</a:t>
             </a:r>
-            <a:endParaRPr lang="zh-CN" altLang="en-US"/>
           </a:p>
           <a:p>
             <a:pPr lvl="3"/>
@@ -3582,7 +3571,6 @@
               <a:rPr lang="zh-CN" altLang="en-US"/>
               <a:t>第四级</a:t>
             </a:r>
-            <a:endParaRPr lang="zh-CN" altLang="en-US"/>
           </a:p>
           <a:p>
             <a:pPr lvl="4"/>
@@ -3590,7 +3578,6 @@
               <a:rPr lang="zh-CN" altLang="en-US"/>
               <a:t>第五级</a:t>
             </a:r>
-            <a:endParaRPr lang="zh-CN" altLang="en-US"/>
           </a:p>
         </p:txBody>
       </p:sp>
@@ -3656,7 +3643,6 @@
               <a:rPr lang="zh-CN" altLang="en-US"/>
               <a:t>单击此处编辑母版文本样式</a:t>
             </a:r>
-            <a:endParaRPr lang="zh-CN" altLang="en-US"/>
           </a:p>
         </p:txBody>
       </p:sp>
@@ -3736,6 +3722,7 @@
             </a:pPr>
             <a:fld id="{47CF39E9-9572-9E49-B134-FDEC1AE55A69}" type="slidenum">
               <a:rPr lang="en-US" altLang="zh-CN"/>
+              <a:t>‹#›</a:t>
             </a:fld>
             <a:endParaRPr lang="en-US" altLang="zh-CN"/>
           </a:p>
@@ -3794,7 +3781,6 @@
               <a:rPr lang="zh-CN" altLang="en-US"/>
               <a:t>单击此处编辑母版标题样式</a:t>
             </a:r>
-            <a:endParaRPr lang="zh-CN" altLang="en-US"/>
           </a:p>
         </p:txBody>
       </p:sp>
@@ -3922,7 +3908,6 @@
               <a:rPr lang="zh-CN" altLang="en-US"/>
               <a:t>单击此处编辑母版文本样式</a:t>
             </a:r>
-            <a:endParaRPr lang="zh-CN" altLang="en-US"/>
           </a:p>
         </p:txBody>
       </p:sp>
@@ -4002,6 +3987,7 @@
             </a:pPr>
             <a:fld id="{AAD90570-B74F-4942-B2AA-60B2857892FD}" type="slidenum">
               <a:rPr lang="en-US" altLang="zh-CN"/>
+              <a:t>‹#›</a:t>
             </a:fld>
             <a:endParaRPr lang="en-US" altLang="zh-CN"/>
           </a:p>
@@ -4083,7 +4069,7 @@
                 <a:solidFill>
                   <a:schemeClr val="tx1"/>
                 </a:solidFill>
-                <a:latin typeface="Tahoma" panose="020B0604030504040204" pitchFamily="34" charset="0"/>
+                <a:latin typeface="Tahoma" panose="020B0804030504040204" pitchFamily="34" charset="0"/>
                 <a:ea typeface="宋体" panose="02010600030101010101" pitchFamily="2" charset="-122"/>
               </a:defRPr>
             </a:lvl1pPr>
@@ -4092,7 +4078,7 @@
                 <a:solidFill>
                   <a:schemeClr val="tx1"/>
                 </a:solidFill>
-                <a:latin typeface="Tahoma" panose="020B0604030504040204" pitchFamily="34" charset="0"/>
+                <a:latin typeface="Tahoma" panose="020B0804030504040204" pitchFamily="34" charset="0"/>
                 <a:ea typeface="宋体" panose="02010600030101010101" pitchFamily="2" charset="-122"/>
               </a:defRPr>
             </a:lvl2pPr>
@@ -4101,7 +4087,7 @@
                 <a:solidFill>
                   <a:schemeClr val="tx1"/>
                 </a:solidFill>
-                <a:latin typeface="Tahoma" panose="020B0604030504040204" pitchFamily="34" charset="0"/>
+                <a:latin typeface="Tahoma" panose="020B0804030504040204" pitchFamily="34" charset="0"/>
                 <a:ea typeface="宋体" panose="02010600030101010101" pitchFamily="2" charset="-122"/>
               </a:defRPr>
             </a:lvl3pPr>
@@ -4110,7 +4096,7 @@
                 <a:solidFill>
                   <a:schemeClr val="tx1"/>
                 </a:solidFill>
-                <a:latin typeface="Tahoma" panose="020B0604030504040204" pitchFamily="34" charset="0"/>
+                <a:latin typeface="Tahoma" panose="020B0804030504040204" pitchFamily="34" charset="0"/>
                 <a:ea typeface="宋体" panose="02010600030101010101" pitchFamily="2" charset="-122"/>
               </a:defRPr>
             </a:lvl4pPr>
@@ -4119,7 +4105,7 @@
                 <a:solidFill>
                   <a:schemeClr val="tx1"/>
                 </a:solidFill>
-                <a:latin typeface="Tahoma" panose="020B0604030504040204" pitchFamily="34" charset="0"/>
+                <a:latin typeface="Tahoma" panose="020B0804030504040204" pitchFamily="34" charset="0"/>
                 <a:ea typeface="宋体" panose="02010600030101010101" pitchFamily="2" charset="-122"/>
               </a:defRPr>
             </a:lvl5pPr>
@@ -4134,7 +4120,7 @@
                 <a:solidFill>
                   <a:schemeClr val="tx1"/>
                 </a:solidFill>
-                <a:latin typeface="Tahoma" panose="020B0604030504040204" pitchFamily="34" charset="0"/>
+                <a:latin typeface="Tahoma" panose="020B0804030504040204" pitchFamily="34" charset="0"/>
                 <a:ea typeface="宋体" panose="02010600030101010101" pitchFamily="2" charset="-122"/>
               </a:defRPr>
             </a:lvl6pPr>
@@ -4149,7 +4135,7 @@
                 <a:solidFill>
                   <a:schemeClr val="tx1"/>
                 </a:solidFill>
-                <a:latin typeface="Tahoma" panose="020B0604030504040204" pitchFamily="34" charset="0"/>
+                <a:latin typeface="Tahoma" panose="020B0804030504040204" pitchFamily="34" charset="0"/>
                 <a:ea typeface="宋体" panose="02010600030101010101" pitchFamily="2" charset="-122"/>
               </a:defRPr>
             </a:lvl7pPr>
@@ -4164,7 +4150,7 @@
                 <a:solidFill>
                   <a:schemeClr val="tx1"/>
                 </a:solidFill>
-                <a:latin typeface="Tahoma" panose="020B0604030504040204" pitchFamily="34" charset="0"/>
+                <a:latin typeface="Tahoma" panose="020B0804030504040204" pitchFamily="34" charset="0"/>
                 <a:ea typeface="宋体" panose="02010600030101010101" pitchFamily="2" charset="-122"/>
               </a:defRPr>
             </a:lvl8pPr>
@@ -4179,7 +4165,7 @@
                 <a:solidFill>
                   <a:schemeClr val="tx1"/>
                 </a:solidFill>
-                <a:latin typeface="Tahoma" panose="020B0604030504040204" pitchFamily="34" charset="0"/>
+                <a:latin typeface="Tahoma" panose="020B0804030504040204" pitchFamily="34" charset="0"/>
                 <a:ea typeface="宋体" panose="02010600030101010101" pitchFamily="2" charset="-122"/>
               </a:defRPr>
             </a:lvl9pPr>
@@ -4243,7 +4229,7 @@
                 <a:solidFill>
                   <a:schemeClr val="tx1"/>
                 </a:solidFill>
-                <a:latin typeface="Tahoma" panose="020B0604030504040204" pitchFamily="34" charset="0"/>
+                <a:latin typeface="Tahoma" panose="020B0804030504040204" pitchFamily="34" charset="0"/>
                 <a:ea typeface="宋体" panose="02010600030101010101" pitchFamily="2" charset="-122"/>
               </a:defRPr>
             </a:lvl1pPr>
@@ -4252,7 +4238,7 @@
                 <a:solidFill>
                   <a:schemeClr val="tx1"/>
                 </a:solidFill>
-                <a:latin typeface="Tahoma" panose="020B0604030504040204" pitchFamily="34" charset="0"/>
+                <a:latin typeface="Tahoma" panose="020B0804030504040204" pitchFamily="34" charset="0"/>
                 <a:ea typeface="宋体" panose="02010600030101010101" pitchFamily="2" charset="-122"/>
               </a:defRPr>
             </a:lvl2pPr>
@@ -4261,7 +4247,7 @@
                 <a:solidFill>
                   <a:schemeClr val="tx1"/>
                 </a:solidFill>
-                <a:latin typeface="Tahoma" panose="020B0604030504040204" pitchFamily="34" charset="0"/>
+                <a:latin typeface="Tahoma" panose="020B0804030504040204" pitchFamily="34" charset="0"/>
                 <a:ea typeface="宋体" panose="02010600030101010101" pitchFamily="2" charset="-122"/>
               </a:defRPr>
             </a:lvl3pPr>
@@ -4270,7 +4256,7 @@
                 <a:solidFill>
                   <a:schemeClr val="tx1"/>
                 </a:solidFill>
-                <a:latin typeface="Tahoma" panose="020B0604030504040204" pitchFamily="34" charset="0"/>
+                <a:latin typeface="Tahoma" panose="020B0804030504040204" pitchFamily="34" charset="0"/>
                 <a:ea typeface="宋体" panose="02010600030101010101" pitchFamily="2" charset="-122"/>
               </a:defRPr>
             </a:lvl4pPr>
@@ -4279,7 +4265,7 @@
                 <a:solidFill>
                   <a:schemeClr val="tx1"/>
                 </a:solidFill>
-                <a:latin typeface="Tahoma" panose="020B0604030504040204" pitchFamily="34" charset="0"/>
+                <a:latin typeface="Tahoma" panose="020B0804030504040204" pitchFamily="34" charset="0"/>
                 <a:ea typeface="宋体" panose="02010600030101010101" pitchFamily="2" charset="-122"/>
               </a:defRPr>
             </a:lvl5pPr>
@@ -4294,7 +4280,7 @@
                 <a:solidFill>
                   <a:schemeClr val="tx1"/>
                 </a:solidFill>
-                <a:latin typeface="Tahoma" panose="020B0604030504040204" pitchFamily="34" charset="0"/>
+                <a:latin typeface="Tahoma" panose="020B0804030504040204" pitchFamily="34" charset="0"/>
                 <a:ea typeface="宋体" panose="02010600030101010101" pitchFamily="2" charset="-122"/>
               </a:defRPr>
             </a:lvl6pPr>
@@ -4309,7 +4295,7 @@
                 <a:solidFill>
                   <a:schemeClr val="tx1"/>
                 </a:solidFill>
-                <a:latin typeface="Tahoma" panose="020B0604030504040204" pitchFamily="34" charset="0"/>
+                <a:latin typeface="Tahoma" panose="020B0804030504040204" pitchFamily="34" charset="0"/>
                 <a:ea typeface="宋体" panose="02010600030101010101" pitchFamily="2" charset="-122"/>
               </a:defRPr>
             </a:lvl7pPr>
@@ -4324,7 +4310,7 @@
                 <a:solidFill>
                   <a:schemeClr val="tx1"/>
                 </a:solidFill>
-                <a:latin typeface="Tahoma" panose="020B0604030504040204" pitchFamily="34" charset="0"/>
+                <a:latin typeface="Tahoma" panose="020B0804030504040204" pitchFamily="34" charset="0"/>
                 <a:ea typeface="宋体" panose="02010600030101010101" pitchFamily="2" charset="-122"/>
               </a:defRPr>
             </a:lvl8pPr>
@@ -4339,7 +4325,7 @@
                 <a:solidFill>
                   <a:schemeClr val="tx1"/>
                 </a:solidFill>
-                <a:latin typeface="Tahoma" panose="020B0604030504040204" pitchFamily="34" charset="0"/>
+                <a:latin typeface="Tahoma" panose="020B0804030504040204" pitchFamily="34" charset="0"/>
                 <a:ea typeface="宋体" panose="02010600030101010101" pitchFamily="2" charset="-122"/>
               </a:defRPr>
             </a:lvl9pPr>
@@ -4395,7 +4381,7 @@
                 <a:solidFill>
                   <a:schemeClr val="tx1"/>
                 </a:solidFill>
-                <a:latin typeface="Tahoma" panose="020B0604030504040204" pitchFamily="34" charset="0"/>
+                <a:latin typeface="Tahoma" panose="020B0804030504040204" pitchFamily="34" charset="0"/>
                 <a:ea typeface="宋体" panose="02010600030101010101" pitchFamily="2" charset="-122"/>
               </a:defRPr>
             </a:lvl1pPr>
@@ -4404,7 +4390,7 @@
                 <a:solidFill>
                   <a:schemeClr val="tx1"/>
                 </a:solidFill>
-                <a:latin typeface="Tahoma" panose="020B0604030504040204" pitchFamily="34" charset="0"/>
+                <a:latin typeface="Tahoma" panose="020B0804030504040204" pitchFamily="34" charset="0"/>
                 <a:ea typeface="宋体" panose="02010600030101010101" pitchFamily="2" charset="-122"/>
               </a:defRPr>
             </a:lvl2pPr>
@@ -4413,7 +4399,7 @@
                 <a:solidFill>
                   <a:schemeClr val="tx1"/>
                 </a:solidFill>
-                <a:latin typeface="Tahoma" panose="020B0604030504040204" pitchFamily="34" charset="0"/>
+                <a:latin typeface="Tahoma" panose="020B0804030504040204" pitchFamily="34" charset="0"/>
                 <a:ea typeface="宋体" panose="02010600030101010101" pitchFamily="2" charset="-122"/>
               </a:defRPr>
             </a:lvl3pPr>
@@ -4422,7 +4408,7 @@
                 <a:solidFill>
                   <a:schemeClr val="tx1"/>
                 </a:solidFill>
-                <a:latin typeface="Tahoma" panose="020B0604030504040204" pitchFamily="34" charset="0"/>
+                <a:latin typeface="Tahoma" panose="020B0804030504040204" pitchFamily="34" charset="0"/>
                 <a:ea typeface="宋体" panose="02010600030101010101" pitchFamily="2" charset="-122"/>
               </a:defRPr>
             </a:lvl4pPr>
@@ -4431,7 +4417,7 @@
                 <a:solidFill>
                   <a:schemeClr val="tx1"/>
                 </a:solidFill>
-                <a:latin typeface="Tahoma" panose="020B0604030504040204" pitchFamily="34" charset="0"/>
+                <a:latin typeface="Tahoma" panose="020B0804030504040204" pitchFamily="34" charset="0"/>
                 <a:ea typeface="宋体" panose="02010600030101010101" pitchFamily="2" charset="-122"/>
               </a:defRPr>
             </a:lvl5pPr>
@@ -4446,7 +4432,7 @@
                 <a:solidFill>
                   <a:schemeClr val="tx1"/>
                 </a:solidFill>
-                <a:latin typeface="Tahoma" panose="020B0604030504040204" pitchFamily="34" charset="0"/>
+                <a:latin typeface="Tahoma" panose="020B0804030504040204" pitchFamily="34" charset="0"/>
                 <a:ea typeface="宋体" panose="02010600030101010101" pitchFamily="2" charset="-122"/>
               </a:defRPr>
             </a:lvl6pPr>
@@ -4461,7 +4447,7 @@
                 <a:solidFill>
                   <a:schemeClr val="tx1"/>
                 </a:solidFill>
-                <a:latin typeface="Tahoma" panose="020B0604030504040204" pitchFamily="34" charset="0"/>
+                <a:latin typeface="Tahoma" panose="020B0804030504040204" pitchFamily="34" charset="0"/>
                 <a:ea typeface="宋体" panose="02010600030101010101" pitchFamily="2" charset="-122"/>
               </a:defRPr>
             </a:lvl7pPr>
@@ -4476,7 +4462,7 @@
                 <a:solidFill>
                   <a:schemeClr val="tx1"/>
                 </a:solidFill>
-                <a:latin typeface="Tahoma" panose="020B0604030504040204" pitchFamily="34" charset="0"/>
+                <a:latin typeface="Tahoma" panose="020B0804030504040204" pitchFamily="34" charset="0"/>
                 <a:ea typeface="宋体" panose="02010600030101010101" pitchFamily="2" charset="-122"/>
               </a:defRPr>
             </a:lvl8pPr>
@@ -4491,7 +4477,7 @@
                 <a:solidFill>
                   <a:schemeClr val="tx1"/>
                 </a:solidFill>
-                <a:latin typeface="Tahoma" panose="020B0604030504040204" pitchFamily="34" charset="0"/>
+                <a:latin typeface="Tahoma" panose="020B0804030504040204" pitchFamily="34" charset="0"/>
                 <a:ea typeface="宋体" panose="02010600030101010101" pitchFamily="2" charset="-122"/>
               </a:defRPr>
             </a:lvl9pPr>
@@ -4555,7 +4541,7 @@
                 <a:solidFill>
                   <a:schemeClr val="tx1"/>
                 </a:solidFill>
-                <a:latin typeface="Tahoma" panose="020B0604030504040204" pitchFamily="34" charset="0"/>
+                <a:latin typeface="Tahoma" panose="020B0804030504040204" pitchFamily="34" charset="0"/>
                 <a:ea typeface="宋体" panose="02010600030101010101" pitchFamily="2" charset="-122"/>
               </a:defRPr>
             </a:lvl1pPr>
@@ -4564,7 +4550,7 @@
                 <a:solidFill>
                   <a:schemeClr val="tx1"/>
                 </a:solidFill>
-                <a:latin typeface="Tahoma" panose="020B0604030504040204" pitchFamily="34" charset="0"/>
+                <a:latin typeface="Tahoma" panose="020B0804030504040204" pitchFamily="34" charset="0"/>
                 <a:ea typeface="宋体" panose="02010600030101010101" pitchFamily="2" charset="-122"/>
               </a:defRPr>
             </a:lvl2pPr>
@@ -4573,7 +4559,7 @@
                 <a:solidFill>
                   <a:schemeClr val="tx1"/>
                 </a:solidFill>
-                <a:latin typeface="Tahoma" panose="020B0604030504040204" pitchFamily="34" charset="0"/>
+                <a:latin typeface="Tahoma" panose="020B0804030504040204" pitchFamily="34" charset="0"/>
                 <a:ea typeface="宋体" panose="02010600030101010101" pitchFamily="2" charset="-122"/>
               </a:defRPr>
             </a:lvl3pPr>
@@ -4582,7 +4568,7 @@
                 <a:solidFill>
                   <a:schemeClr val="tx1"/>
                 </a:solidFill>
-                <a:latin typeface="Tahoma" panose="020B0604030504040204" pitchFamily="34" charset="0"/>
+                <a:latin typeface="Tahoma" panose="020B0804030504040204" pitchFamily="34" charset="0"/>
                 <a:ea typeface="宋体" panose="02010600030101010101" pitchFamily="2" charset="-122"/>
               </a:defRPr>
             </a:lvl4pPr>
@@ -4591,7 +4577,7 @@
                 <a:solidFill>
                   <a:schemeClr val="tx1"/>
                 </a:solidFill>
-                <a:latin typeface="Tahoma" panose="020B0604030504040204" pitchFamily="34" charset="0"/>
+                <a:latin typeface="Tahoma" panose="020B0804030504040204" pitchFamily="34" charset="0"/>
                 <a:ea typeface="宋体" panose="02010600030101010101" pitchFamily="2" charset="-122"/>
               </a:defRPr>
             </a:lvl5pPr>
@@ -4606,7 +4592,7 @@
                 <a:solidFill>
                   <a:schemeClr val="tx1"/>
                 </a:solidFill>
-                <a:latin typeface="Tahoma" panose="020B0604030504040204" pitchFamily="34" charset="0"/>
+                <a:latin typeface="Tahoma" panose="020B0804030504040204" pitchFamily="34" charset="0"/>
                 <a:ea typeface="宋体" panose="02010600030101010101" pitchFamily="2" charset="-122"/>
               </a:defRPr>
             </a:lvl6pPr>
@@ -4621,7 +4607,7 @@
                 <a:solidFill>
                   <a:schemeClr val="tx1"/>
                 </a:solidFill>
-                <a:latin typeface="Tahoma" panose="020B0604030504040204" pitchFamily="34" charset="0"/>
+                <a:latin typeface="Tahoma" panose="020B0804030504040204" pitchFamily="34" charset="0"/>
                 <a:ea typeface="宋体" panose="02010600030101010101" pitchFamily="2" charset="-122"/>
               </a:defRPr>
             </a:lvl7pPr>
@@ -4636,7 +4622,7 @@
                 <a:solidFill>
                   <a:schemeClr val="tx1"/>
                 </a:solidFill>
-                <a:latin typeface="Tahoma" panose="020B0604030504040204" pitchFamily="34" charset="0"/>
+                <a:latin typeface="Tahoma" panose="020B0804030504040204" pitchFamily="34" charset="0"/>
                 <a:ea typeface="宋体" panose="02010600030101010101" pitchFamily="2" charset="-122"/>
               </a:defRPr>
             </a:lvl8pPr>
@@ -4651,7 +4637,7 @@
                 <a:solidFill>
                   <a:schemeClr val="tx1"/>
                 </a:solidFill>
-                <a:latin typeface="Tahoma" panose="020B0604030504040204" pitchFamily="34" charset="0"/>
+                <a:latin typeface="Tahoma" panose="020B0804030504040204" pitchFamily="34" charset="0"/>
                 <a:ea typeface="宋体" panose="02010600030101010101" pitchFamily="2" charset="-122"/>
               </a:defRPr>
             </a:lvl9pPr>
@@ -4715,7 +4701,7 @@
                 <a:solidFill>
                   <a:schemeClr val="tx1"/>
                 </a:solidFill>
-                <a:latin typeface="Tahoma" panose="020B0604030504040204" pitchFamily="34" charset="0"/>
+                <a:latin typeface="Tahoma" panose="020B0804030504040204" pitchFamily="34" charset="0"/>
                 <a:ea typeface="宋体" panose="02010600030101010101" pitchFamily="2" charset="-122"/>
               </a:defRPr>
             </a:lvl1pPr>
@@ -4724,7 +4710,7 @@
                 <a:solidFill>
                   <a:schemeClr val="tx1"/>
                 </a:solidFill>
-                <a:latin typeface="Tahoma" panose="020B0604030504040204" pitchFamily="34" charset="0"/>
+                <a:latin typeface="Tahoma" panose="020B0804030504040204" pitchFamily="34" charset="0"/>
                 <a:ea typeface="宋体" panose="02010600030101010101" pitchFamily="2" charset="-122"/>
               </a:defRPr>
             </a:lvl2pPr>
@@ -4733,7 +4719,7 @@
                 <a:solidFill>
                   <a:schemeClr val="tx1"/>
                 </a:solidFill>
-                <a:latin typeface="Tahoma" panose="020B0604030504040204" pitchFamily="34" charset="0"/>
+                <a:latin typeface="Tahoma" panose="020B0804030504040204" pitchFamily="34" charset="0"/>
                 <a:ea typeface="宋体" panose="02010600030101010101" pitchFamily="2" charset="-122"/>
               </a:defRPr>
             </a:lvl3pPr>
@@ -4742,7 +4728,7 @@
                 <a:solidFill>
                   <a:schemeClr val="tx1"/>
                 </a:solidFill>
-                <a:latin typeface="Tahoma" panose="020B0604030504040204" pitchFamily="34" charset="0"/>
+                <a:latin typeface="Tahoma" panose="020B0804030504040204" pitchFamily="34" charset="0"/>
                 <a:ea typeface="宋体" panose="02010600030101010101" pitchFamily="2" charset="-122"/>
               </a:defRPr>
             </a:lvl4pPr>
@@ -4751,7 +4737,7 @@
                 <a:solidFill>
                   <a:schemeClr val="tx1"/>
                 </a:solidFill>
-                <a:latin typeface="Tahoma" panose="020B0604030504040204" pitchFamily="34" charset="0"/>
+                <a:latin typeface="Tahoma" panose="020B0804030504040204" pitchFamily="34" charset="0"/>
                 <a:ea typeface="宋体" panose="02010600030101010101" pitchFamily="2" charset="-122"/>
               </a:defRPr>
             </a:lvl5pPr>
@@ -4766,7 +4752,7 @@
                 <a:solidFill>
                   <a:schemeClr val="tx1"/>
                 </a:solidFill>
-                <a:latin typeface="Tahoma" panose="020B0604030504040204" pitchFamily="34" charset="0"/>
+                <a:latin typeface="Tahoma" panose="020B0804030504040204" pitchFamily="34" charset="0"/>
                 <a:ea typeface="宋体" panose="02010600030101010101" pitchFamily="2" charset="-122"/>
               </a:defRPr>
             </a:lvl6pPr>
@@ -4781,7 +4767,7 @@
                 <a:solidFill>
                   <a:schemeClr val="tx1"/>
                 </a:solidFill>
-                <a:latin typeface="Tahoma" panose="020B0604030504040204" pitchFamily="34" charset="0"/>
+                <a:latin typeface="Tahoma" panose="020B0804030504040204" pitchFamily="34" charset="0"/>
                 <a:ea typeface="宋体" panose="02010600030101010101" pitchFamily="2" charset="-122"/>
               </a:defRPr>
             </a:lvl7pPr>
@@ -4796,7 +4782,7 @@
                 <a:solidFill>
                   <a:schemeClr val="tx1"/>
                 </a:solidFill>
-                <a:latin typeface="Tahoma" panose="020B0604030504040204" pitchFamily="34" charset="0"/>
+                <a:latin typeface="Tahoma" panose="020B0804030504040204" pitchFamily="34" charset="0"/>
                 <a:ea typeface="宋体" panose="02010600030101010101" pitchFamily="2" charset="-122"/>
               </a:defRPr>
             </a:lvl8pPr>
@@ -4811,7 +4797,7 @@
                 <a:solidFill>
                   <a:schemeClr val="tx1"/>
                 </a:solidFill>
-                <a:latin typeface="Tahoma" panose="020B0604030504040204" pitchFamily="34" charset="0"/>
+                <a:latin typeface="Tahoma" panose="020B0804030504040204" pitchFamily="34" charset="0"/>
                 <a:ea typeface="宋体" panose="02010600030101010101" pitchFamily="2" charset="-122"/>
               </a:defRPr>
             </a:lvl9pPr>
@@ -4867,7 +4853,7 @@
                 <a:solidFill>
                   <a:schemeClr val="tx1"/>
                 </a:solidFill>
-                <a:latin typeface="Tahoma" panose="020B0604030504040204" pitchFamily="34" charset="0"/>
+                <a:latin typeface="Tahoma" panose="020B0804030504040204" pitchFamily="34" charset="0"/>
                 <a:ea typeface="宋体" panose="02010600030101010101" pitchFamily="2" charset="-122"/>
               </a:defRPr>
             </a:lvl1pPr>
@@ -4876,7 +4862,7 @@
                 <a:solidFill>
                   <a:schemeClr val="tx1"/>
                 </a:solidFill>
-                <a:latin typeface="Tahoma" panose="020B0604030504040204" pitchFamily="34" charset="0"/>
+                <a:latin typeface="Tahoma" panose="020B0804030504040204" pitchFamily="34" charset="0"/>
                 <a:ea typeface="宋体" panose="02010600030101010101" pitchFamily="2" charset="-122"/>
               </a:defRPr>
             </a:lvl2pPr>
@@ -4885,7 +4871,7 @@
                 <a:solidFill>
                   <a:schemeClr val="tx1"/>
                 </a:solidFill>
-                <a:latin typeface="Tahoma" panose="020B0604030504040204" pitchFamily="34" charset="0"/>
+                <a:latin typeface="Tahoma" panose="020B0804030504040204" pitchFamily="34" charset="0"/>
                 <a:ea typeface="宋体" panose="02010600030101010101" pitchFamily="2" charset="-122"/>
               </a:defRPr>
             </a:lvl3pPr>
@@ -4894,7 +4880,7 @@
                 <a:solidFill>
                   <a:schemeClr val="tx1"/>
                 </a:solidFill>
-                <a:latin typeface="Tahoma" panose="020B0604030504040204" pitchFamily="34" charset="0"/>
+                <a:latin typeface="Tahoma" panose="020B0804030504040204" pitchFamily="34" charset="0"/>
                 <a:ea typeface="宋体" panose="02010600030101010101" pitchFamily="2" charset="-122"/>
               </a:defRPr>
             </a:lvl4pPr>
@@ -4903,7 +4889,7 @@
                 <a:solidFill>
                   <a:schemeClr val="tx1"/>
                 </a:solidFill>
-                <a:latin typeface="Tahoma" panose="020B0604030504040204" pitchFamily="34" charset="0"/>
+                <a:latin typeface="Tahoma" panose="020B0804030504040204" pitchFamily="34" charset="0"/>
                 <a:ea typeface="宋体" panose="02010600030101010101" pitchFamily="2" charset="-122"/>
               </a:defRPr>
             </a:lvl5pPr>
@@ -4918,7 +4904,7 @@
                 <a:solidFill>
                   <a:schemeClr val="tx1"/>
                 </a:solidFill>
-                <a:latin typeface="Tahoma" panose="020B0604030504040204" pitchFamily="34" charset="0"/>
+                <a:latin typeface="Tahoma" panose="020B0804030504040204" pitchFamily="34" charset="0"/>
                 <a:ea typeface="宋体" panose="02010600030101010101" pitchFamily="2" charset="-122"/>
               </a:defRPr>
             </a:lvl6pPr>
@@ -4933,7 +4919,7 @@
                 <a:solidFill>
                   <a:schemeClr val="tx1"/>
                 </a:solidFill>
-                <a:latin typeface="Tahoma" panose="020B0604030504040204" pitchFamily="34" charset="0"/>
+                <a:latin typeface="Tahoma" panose="020B0804030504040204" pitchFamily="34" charset="0"/>
                 <a:ea typeface="宋体" panose="02010600030101010101" pitchFamily="2" charset="-122"/>
               </a:defRPr>
             </a:lvl7pPr>
@@ -4948,7 +4934,7 @@
                 <a:solidFill>
                   <a:schemeClr val="tx1"/>
                 </a:solidFill>
-                <a:latin typeface="Tahoma" panose="020B0604030504040204" pitchFamily="34" charset="0"/>
+                <a:latin typeface="Tahoma" panose="020B0804030504040204" pitchFamily="34" charset="0"/>
                 <a:ea typeface="宋体" panose="02010600030101010101" pitchFamily="2" charset="-122"/>
               </a:defRPr>
             </a:lvl8pPr>
@@ -4963,7 +4949,7 @@
                 <a:solidFill>
                   <a:schemeClr val="tx1"/>
                 </a:solidFill>
-                <a:latin typeface="Tahoma" panose="020B0604030504040204" pitchFamily="34" charset="0"/>
+                <a:latin typeface="Tahoma" panose="020B0804030504040204" pitchFamily="34" charset="0"/>
                 <a:ea typeface="宋体" panose="02010600030101010101" pitchFamily="2" charset="-122"/>
               </a:defRPr>
             </a:lvl9pPr>
@@ -5027,7 +5013,7 @@
                 <a:solidFill>
                   <a:schemeClr val="tx1"/>
                 </a:solidFill>
-                <a:latin typeface="Tahoma" panose="020B0604030504040204" pitchFamily="34" charset="0"/>
+                <a:latin typeface="Tahoma" panose="020B0804030504040204" pitchFamily="34" charset="0"/>
                 <a:ea typeface="宋体" panose="02010600030101010101" pitchFamily="2" charset="-122"/>
               </a:defRPr>
             </a:lvl1pPr>
@@ -5036,7 +5022,7 @@
                 <a:solidFill>
                   <a:schemeClr val="tx1"/>
                 </a:solidFill>
-                <a:latin typeface="Tahoma" panose="020B0604030504040204" pitchFamily="34" charset="0"/>
+                <a:latin typeface="Tahoma" panose="020B0804030504040204" pitchFamily="34" charset="0"/>
                 <a:ea typeface="宋体" panose="02010600030101010101" pitchFamily="2" charset="-122"/>
               </a:defRPr>
             </a:lvl2pPr>
@@ -5045,7 +5031,7 @@
                 <a:solidFill>
                   <a:schemeClr val="tx1"/>
                 </a:solidFill>
-                <a:latin typeface="Tahoma" panose="020B0604030504040204" pitchFamily="34" charset="0"/>
+                <a:latin typeface="Tahoma" panose="020B0804030504040204" pitchFamily="34" charset="0"/>
                 <a:ea typeface="宋体" panose="02010600030101010101" pitchFamily="2" charset="-122"/>
               </a:defRPr>
             </a:lvl3pPr>
@@ -5054,7 +5040,7 @@
                 <a:solidFill>
                   <a:schemeClr val="tx1"/>
                 </a:solidFill>
-                <a:latin typeface="Tahoma" panose="020B0604030504040204" pitchFamily="34" charset="0"/>
+                <a:latin typeface="Tahoma" panose="020B0804030504040204" pitchFamily="34" charset="0"/>
                 <a:ea typeface="宋体" panose="02010600030101010101" pitchFamily="2" charset="-122"/>
               </a:defRPr>
             </a:lvl4pPr>
@@ -5063,7 +5049,7 @@
                 <a:solidFill>
                   <a:schemeClr val="tx1"/>
                 </a:solidFill>
-                <a:latin typeface="Tahoma" panose="020B0604030504040204" pitchFamily="34" charset="0"/>
+                <a:latin typeface="Tahoma" panose="020B0804030504040204" pitchFamily="34" charset="0"/>
                 <a:ea typeface="宋体" panose="02010600030101010101" pitchFamily="2" charset="-122"/>
               </a:defRPr>
             </a:lvl5pPr>
@@ -5078,7 +5064,7 @@
                 <a:solidFill>
                   <a:schemeClr val="tx1"/>
                 </a:solidFill>
-                <a:latin typeface="Tahoma" panose="020B0604030504040204" pitchFamily="34" charset="0"/>
+                <a:latin typeface="Tahoma" panose="020B0804030504040204" pitchFamily="34" charset="0"/>
                 <a:ea typeface="宋体" panose="02010600030101010101" pitchFamily="2" charset="-122"/>
               </a:defRPr>
             </a:lvl6pPr>
@@ -5093,7 +5079,7 @@
                 <a:solidFill>
                   <a:schemeClr val="tx1"/>
                 </a:solidFill>
-                <a:latin typeface="Tahoma" panose="020B0604030504040204" pitchFamily="34" charset="0"/>
+                <a:latin typeface="Tahoma" panose="020B0804030504040204" pitchFamily="34" charset="0"/>
                 <a:ea typeface="宋体" panose="02010600030101010101" pitchFamily="2" charset="-122"/>
               </a:defRPr>
             </a:lvl7pPr>
@@ -5108,7 +5094,7 @@
                 <a:solidFill>
                   <a:schemeClr val="tx1"/>
                 </a:solidFill>
-                <a:latin typeface="Tahoma" panose="020B0604030504040204" pitchFamily="34" charset="0"/>
+                <a:latin typeface="Tahoma" panose="020B0804030504040204" pitchFamily="34" charset="0"/>
                 <a:ea typeface="宋体" panose="02010600030101010101" pitchFamily="2" charset="-122"/>
               </a:defRPr>
             </a:lvl8pPr>
@@ -5123,7 +5109,7 @@
                 <a:solidFill>
                   <a:schemeClr val="tx1"/>
                 </a:solidFill>
-                <a:latin typeface="Tahoma" panose="020B0604030504040204" pitchFamily="34" charset="0"/>
+                <a:latin typeface="Tahoma" panose="020B0804030504040204" pitchFamily="34" charset="0"/>
                 <a:ea typeface="宋体" panose="02010600030101010101" pitchFamily="2" charset="-122"/>
               </a:defRPr>
             </a:lvl9pPr>
@@ -5187,7 +5173,6 @@
               <a:rPr lang="zh-CN" altLang="en-US"/>
               <a:t>单击此处编辑母版标题样式</a:t>
             </a:r>
-            <a:endParaRPr lang="zh-CN" altLang="en-US"/>
           </a:p>
         </p:txBody>
       </p:sp>
@@ -5242,7 +5227,6 @@
               <a:rPr lang="zh-CN" altLang="en-US"/>
               <a:t>单击此处编辑母版文本样式</a:t>
             </a:r>
-            <a:endParaRPr lang="zh-CN" altLang="en-US"/>
           </a:p>
           <a:p>
             <a:pPr lvl="1"/>
@@ -5250,7 +5234,6 @@
               <a:rPr lang="zh-CN" altLang="en-US"/>
               <a:t>第二级</a:t>
             </a:r>
-            <a:endParaRPr lang="zh-CN" altLang="en-US"/>
           </a:p>
           <a:p>
             <a:pPr lvl="2"/>
@@ -5258,7 +5241,6 @@
               <a:rPr lang="zh-CN" altLang="en-US"/>
               <a:t>第三级</a:t>
             </a:r>
-            <a:endParaRPr lang="zh-CN" altLang="en-US"/>
           </a:p>
           <a:p>
             <a:pPr lvl="3"/>
@@ -5266,7 +5248,6 @@
               <a:rPr lang="zh-CN" altLang="en-US"/>
               <a:t>第四级</a:t>
             </a:r>
-            <a:endParaRPr lang="zh-CN" altLang="en-US"/>
           </a:p>
           <a:p>
             <a:pPr lvl="4"/>
@@ -5274,7 +5255,6 @@
               <a:rPr lang="zh-CN" altLang="en-US"/>
               <a:t>第五级</a:t>
             </a:r>
-            <a:endParaRPr lang="zh-CN" altLang="en-US"/>
           </a:p>
         </p:txBody>
       </p:sp>
@@ -5396,6 +5376,7 @@
             </a:pPr>
             <a:fld id="{86341646-FDBD-CE4B-9805-936968DD15EC}" type="slidenum">
               <a:rPr lang="en-US" altLang="zh-CN"/>
+              <a:t>‹#›</a:t>
             </a:fld>
             <a:endParaRPr lang="en-US" altLang="zh-CN"/>
           </a:p>
@@ -5446,7 +5427,7 @@
           <a:solidFill>
             <a:schemeClr val="tx2"/>
           </a:solidFill>
-          <a:latin typeface="Tahoma" panose="020B0604030504040204" pitchFamily="34" charset="0"/>
+          <a:latin typeface="Tahoma" panose="020B0804030504040204" pitchFamily="34" charset="0"/>
           <a:ea typeface="宋体" panose="02010600030101010101" pitchFamily="2" charset="-122"/>
         </a:defRPr>
       </a:lvl2pPr>
@@ -5461,7 +5442,7 @@
           <a:solidFill>
             <a:schemeClr val="tx2"/>
           </a:solidFill>
-          <a:latin typeface="Tahoma" panose="020B0604030504040204" pitchFamily="34" charset="0"/>
+          <a:latin typeface="Tahoma" panose="020B0804030504040204" pitchFamily="34" charset="0"/>
           <a:ea typeface="宋体" panose="02010600030101010101" pitchFamily="2" charset="-122"/>
         </a:defRPr>
       </a:lvl3pPr>
@@ -5476,7 +5457,7 @@
           <a:solidFill>
             <a:schemeClr val="tx2"/>
           </a:solidFill>
-          <a:latin typeface="Tahoma" panose="020B0604030504040204" pitchFamily="34" charset="0"/>
+          <a:latin typeface="Tahoma" panose="020B0804030504040204" pitchFamily="34" charset="0"/>
           <a:ea typeface="宋体" panose="02010600030101010101" pitchFamily="2" charset="-122"/>
         </a:defRPr>
       </a:lvl4pPr>
@@ -5491,7 +5472,7 @@
           <a:solidFill>
             <a:schemeClr val="tx2"/>
           </a:solidFill>
-          <a:latin typeface="Tahoma" panose="020B0604030504040204" pitchFamily="34" charset="0"/>
+          <a:latin typeface="Tahoma" panose="020B0804030504040204" pitchFamily="34" charset="0"/>
           <a:ea typeface="宋体" panose="02010600030101010101" pitchFamily="2" charset="-122"/>
         </a:defRPr>
       </a:lvl5pPr>
@@ -5506,7 +5487,7 @@
           <a:solidFill>
             <a:schemeClr val="tx2"/>
           </a:solidFill>
-          <a:latin typeface="Tahoma" panose="020B0604030504040204" pitchFamily="34" charset="0"/>
+          <a:latin typeface="Tahoma" panose="020B0804030504040204" pitchFamily="34" charset="0"/>
           <a:ea typeface="宋体" panose="02010600030101010101" pitchFamily="2" charset="-122"/>
         </a:defRPr>
       </a:lvl6pPr>
@@ -5521,7 +5502,7 @@
           <a:solidFill>
             <a:schemeClr val="tx2"/>
           </a:solidFill>
-          <a:latin typeface="Tahoma" panose="020B0604030504040204" pitchFamily="34" charset="0"/>
+          <a:latin typeface="Tahoma" panose="020B0804030504040204" pitchFamily="34" charset="0"/>
           <a:ea typeface="宋体" panose="02010600030101010101" pitchFamily="2" charset="-122"/>
         </a:defRPr>
       </a:lvl7pPr>
@@ -5536,7 +5517,7 @@
           <a:solidFill>
             <a:schemeClr val="tx2"/>
           </a:solidFill>
-          <a:latin typeface="Tahoma" panose="020B0604030504040204" pitchFamily="34" charset="0"/>
+          <a:latin typeface="Tahoma" panose="020B0804030504040204" pitchFamily="34" charset="0"/>
           <a:ea typeface="宋体" panose="02010600030101010101" pitchFamily="2" charset="-122"/>
         </a:defRPr>
       </a:lvl8pPr>
@@ -5551,7 +5532,7 @@
           <a:solidFill>
             <a:schemeClr val="tx2"/>
           </a:solidFill>
-          <a:latin typeface="Tahoma" panose="020B0604030504040204" pitchFamily="34" charset="0"/>
+          <a:latin typeface="Tahoma" panose="020B0804030504040204" pitchFamily="34" charset="0"/>
           <a:ea typeface="宋体" panose="02010600030101010101" pitchFamily="2" charset="-122"/>
         </a:defRPr>
       </a:lvl9pPr>
@@ -5884,7 +5865,6 @@
               <a:rPr lang="en-US" altLang="zh-CN"/>
               <a:t>Overview</a:t>
             </a:r>
-            <a:endParaRPr lang="en-US" altLang="zh-CN"/>
           </a:p>
         </p:txBody>
       </p:sp>
@@ -5908,7 +5888,6 @@
               <a:rPr lang="en-US" altLang="zh-CN" sz="3600" dirty="0"/>
               <a:t>Formal Methods Foundation</a:t>
             </a:r>
-            <a:endParaRPr lang="en-US" altLang="zh-CN" sz="3600" dirty="0"/>
           </a:p>
           <a:p>
             <a:pPr eaLnBrk="1" hangingPunct="1"/>
@@ -5920,7 +5899,6 @@
               <a:rPr lang="en-US" altLang="zh-CN" sz="2800" dirty="0"/>
               <a:t> Hua</a:t>
             </a:r>
-            <a:endParaRPr lang="en-US" altLang="zh-CN" sz="2800" dirty="0"/>
           </a:p>
           <a:p>
             <a:pPr eaLnBrk="1" hangingPunct="1"/>
@@ -5985,7 +5963,6 @@
               <a:rPr lang="en-US" altLang="zh-CN"/>
               <a:t>webpages</a:t>
             </a:r>
-            <a:endParaRPr lang="en-US" altLang="zh-CN"/>
           </a:p>
         </p:txBody>
       </p:sp>
@@ -6017,15 +5994,24 @@
               <a:rPr lang="en-US" altLang="zh-CN" dirty="0"/>
               <a:t>homepage:</a:t>
             </a:r>
-            <a:endParaRPr lang="en-US" altLang="zh-CN" dirty="0"/>
           </a:p>
           <a:p>
             <a:pPr lvl="1" eaLnBrk="1" hangingPunct="1"/>
             <a:r>
-              <a:rPr lang="en-US" altLang="zh-CN" sz="2000" dirty="0">
-                <a:hlinkClick r:id="rId1"/>
-              </a:rPr>
-              <a:t>http://staff.ustc.edu.cn/~bjhua/courses/theory/2021</a:t>
+              <a:rPr lang="en-US" altLang="zh-CN" sz="2000" dirty="0"/>
+              <a:t>https://</a:t>
+            </a:r>
+            <a:r>
+              <a:rPr lang="en-US" altLang="zh-CN" sz="2000" dirty="0" err="1"/>
+              <a:t>csslab-ustc.github.io</a:t>
+            </a:r>
+            <a:r>
+              <a:rPr lang="en-US" altLang="zh-CN" sz="2000" dirty="0"/>
+              <a:t>/courses/theory/</a:t>
+            </a:r>
+            <a:r>
+              <a:rPr lang="en-US" altLang="zh-CN" sz="2000" dirty="0" err="1"/>
+              <a:t>index.html</a:t>
             </a:r>
             <a:endParaRPr lang="en-US" altLang="zh-CN" sz="2000" dirty="0"/>
           </a:p>
@@ -6035,7 +6021,6 @@
               <a:rPr lang="en-US" altLang="zh-CN" dirty="0"/>
               <a:t>People:</a:t>
             </a:r>
-            <a:endParaRPr lang="en-US" altLang="zh-CN" dirty="0"/>
           </a:p>
           <a:p>
             <a:pPr lvl="1" eaLnBrk="1" hangingPunct="1"/>
@@ -6059,21 +6044,20 @@
               <a:rPr lang="en-US" altLang="zh-CN" sz="2400" dirty="0"/>
               <a:t>(instructor)</a:t>
             </a:r>
-            <a:endParaRPr lang="en-US" altLang="zh-CN" sz="2400" dirty="0"/>
           </a:p>
           <a:p>
             <a:pPr lvl="1" eaLnBrk="1" hangingPunct="1"/>
             <a:r>
-              <a:rPr lang="en-US" altLang="zh-CN" sz="2400" dirty="0" err="1"/>
-              <a:t>Qiliang</a:t>
+              <a:rPr lang="en-US" sz="2400" dirty="0"/>
+              <a:t>Lei</a:t>
             </a:r>
             <a:r>
               <a:rPr lang="zh-CN" altLang="en-US" sz="2400" dirty="0"/>
               <a:t> </a:t>
             </a:r>
             <a:r>
-              <a:rPr lang="en-US" altLang="zh-CN" sz="2400" dirty="0"/>
-              <a:t>Fan</a:t>
+              <a:rPr lang="en-US" sz="2400" dirty="0"/>
+              <a:t>Xia</a:t>
             </a:r>
             <a:r>
               <a:rPr lang="zh-CN" altLang="en-US" sz="2400" dirty="0"/>
@@ -6083,13 +6067,12 @@
               <a:rPr lang="en-US" altLang="zh-CN" sz="2400" dirty="0"/>
               <a:t>(TA)</a:t>
             </a:r>
-            <a:endParaRPr lang="en-US" altLang="zh-CN" sz="2400" dirty="0"/>
           </a:p>
           <a:p>
             <a:pPr lvl="1" eaLnBrk="1" hangingPunct="1"/>
             <a:r>
               <a:rPr lang="en-US" altLang="zh-CN" sz="2400" dirty="0" err="1"/>
-              <a:t>Zhizhong</a:t>
+              <a:t>Junjie</a:t>
             </a:r>
             <a:r>
               <a:rPr lang="zh-CN" altLang="en-US" sz="2400" dirty="0"/>
@@ -6097,7 +6080,7 @@
             </a:r>
             <a:r>
               <a:rPr lang="en-US" altLang="zh-CN" sz="2400" dirty="0"/>
-              <a:t>Pan</a:t>
+              <a:t>Zhuang</a:t>
             </a:r>
             <a:r>
               <a:rPr lang="zh-CN" altLang="en-US" sz="2400" dirty="0"/>
@@ -6107,7 +6090,6 @@
               <a:rPr lang="en-US" altLang="zh-CN" sz="2400" dirty="0"/>
               <a:t>(TA)</a:t>
             </a:r>
-            <a:endParaRPr lang="en-US" altLang="zh-CN" sz="2400" dirty="0"/>
           </a:p>
           <a:p>
             <a:pPr eaLnBrk="1" hangingPunct="1"/>
@@ -6155,7 +6137,6 @@
               <a:rPr lang="en-US" altLang="zh-CN" dirty="0"/>
               <a:t>details</a:t>
             </a:r>
-            <a:endParaRPr lang="en-US" altLang="zh-CN" dirty="0"/>
           </a:p>
         </p:txBody>
       </p:sp>
@@ -6204,7 +6185,6 @@
               <a:rPr lang="en-US" altLang="zh-CN"/>
               <a:t>Structure of this course</a:t>
             </a:r>
-            <a:endParaRPr lang="en-US" altLang="zh-CN"/>
           </a:p>
         </p:txBody>
       </p:sp>
@@ -6232,19 +6212,29 @@
               </a:rPr>
               <a:t>Lectures</a:t>
             </a:r>
-            <a:endParaRPr lang="en-US" altLang="zh-CN" i="1" dirty="0">
-              <a:solidFill>
-                <a:srgbClr val="0000FF"/>
-              </a:solidFill>
-            </a:endParaRPr>
           </a:p>
           <a:p>
             <a:pPr lvl="1" eaLnBrk="1" hangingPunct="1"/>
             <a:r>
               <a:rPr lang="en-US" altLang="zh-CN" dirty="0"/>
-              <a:t>Friday, 14pm</a:t>
-            </a:r>
-            <a:endParaRPr lang="en-US" altLang="zh-CN" dirty="0"/>
+              <a:t>Monday</a:t>
+            </a:r>
+            <a:r>
+              <a:rPr lang="zh-CN" altLang="en-US" dirty="0"/>
+              <a:t> </a:t>
+            </a:r>
+            <a:r>
+              <a:rPr lang="en-US" altLang="zh-CN" dirty="0"/>
+              <a:t>&amp;</a:t>
+            </a:r>
+            <a:r>
+              <a:rPr lang="zh-CN" altLang="en-US" dirty="0"/>
+              <a:t> </a:t>
+            </a:r>
+            <a:r>
+              <a:rPr lang="en-US" altLang="zh-CN" dirty="0"/>
+              <a:t>Tuesday, 14pm</a:t>
+            </a:r>
           </a:p>
           <a:p>
             <a:pPr lvl="1" eaLnBrk="1" hangingPunct="1"/>
@@ -6260,7 +6250,6 @@
               <a:rPr lang="en-US" altLang="zh-CN" dirty="0"/>
               <a:t>+ slides</a:t>
             </a:r>
-            <a:endParaRPr lang="en-US" altLang="zh-CN" dirty="0"/>
           </a:p>
           <a:p>
             <a:pPr eaLnBrk="1" hangingPunct="1"/>
@@ -6272,17 +6261,20 @@
               </a:rPr>
               <a:t>Recitation</a:t>
             </a:r>
-            <a:endParaRPr lang="en-US" altLang="zh-CN" i="1" dirty="0">
-              <a:solidFill>
-                <a:srgbClr val="0432FF"/>
-              </a:solidFill>
-            </a:endParaRPr>
           </a:p>
           <a:p>
             <a:pPr lvl="1" eaLnBrk="1" hangingPunct="1"/>
             <a:r>
               <a:rPr lang="en-US" altLang="zh-CN" dirty="0"/>
-              <a:t>1/per</a:t>
+              <a:t>1</a:t>
+            </a:r>
+            <a:r>
+              <a:rPr lang="zh-CN" altLang="en-US" dirty="0"/>
+              <a:t> </a:t>
+            </a:r>
+            <a:r>
+              <a:rPr lang="en-US" altLang="zh-CN" dirty="0"/>
+              <a:t>per</a:t>
             </a:r>
             <a:r>
               <a:rPr lang="zh-CN" altLang="en-US" dirty="0"/>
@@ -6298,7 +6290,7 @@
             </a:r>
             <a:r>
               <a:rPr lang="en-US" altLang="zh-CN" dirty="0"/>
-              <a:t>lead</a:t>
+              <a:t>led</a:t>
             </a:r>
             <a:r>
               <a:rPr lang="zh-CN" altLang="en-US" dirty="0"/>
@@ -6324,7 +6316,6 @@
               <a:rPr lang="en-US" altLang="zh-CN" dirty="0"/>
               <a:t>TAs</a:t>
             </a:r>
-            <a:endParaRPr lang="en-US" altLang="zh-CN" dirty="0"/>
           </a:p>
           <a:p>
             <a:pPr eaLnBrk="1" hangingPunct="1"/>
@@ -6336,17 +6327,12 @@
               </a:rPr>
               <a:t>Assignment (Practice first)</a:t>
             </a:r>
-            <a:endParaRPr lang="en-US" altLang="zh-CN" i="1" dirty="0">
-              <a:solidFill>
-                <a:srgbClr val="0000FF"/>
-              </a:solidFill>
-            </a:endParaRPr>
           </a:p>
           <a:p>
             <a:pPr lvl="1" eaLnBrk="1" hangingPunct="1"/>
             <a:r>
               <a:rPr lang="en-US" altLang="zh-CN" dirty="0"/>
-              <a:t>9-10</a:t>
+              <a:t>9</a:t>
             </a:r>
             <a:r>
               <a:rPr lang="zh-CN" altLang="en-US" dirty="0"/>
@@ -6364,7 +6350,6 @@
               <a:rPr lang="en-US" altLang="zh-CN" dirty="0"/>
               <a:t>planned</a:t>
             </a:r>
-            <a:endParaRPr lang="en-US" altLang="zh-CN" dirty="0"/>
           </a:p>
           <a:p>
             <a:pPr eaLnBrk="1" hangingPunct="1"/>
@@ -6376,35 +6361,13 @@
               </a:rPr>
               <a:t>Test</a:t>
             </a:r>
-            <a:endParaRPr lang="en-US" altLang="zh-CN" i="1" dirty="0">
-              <a:solidFill>
-                <a:srgbClr val="0000FF"/>
-              </a:solidFill>
-            </a:endParaRPr>
           </a:p>
           <a:p>
             <a:pPr lvl="1" eaLnBrk="1" hangingPunct="1"/>
             <a:r>
               <a:rPr lang="en-US" altLang="zh-CN" dirty="0"/>
-              <a:t>Middle</a:t>
-            </a:r>
-            <a:r>
-              <a:rPr lang="zh-CN" altLang="en-US" dirty="0"/>
-              <a:t> </a:t>
-            </a:r>
-            <a:r>
-              <a:rPr lang="en-US" altLang="zh-CN" dirty="0"/>
-              <a:t>+</a:t>
-            </a:r>
-            <a:r>
-              <a:rPr lang="zh-CN" altLang="en-US" dirty="0"/>
-              <a:t> </a:t>
-            </a:r>
-            <a:r>
-              <a:rPr lang="en-US" altLang="zh-CN" dirty="0"/>
               <a:t>final</a:t>
             </a:r>
-            <a:endParaRPr lang="en-US" altLang="zh-CN" dirty="0"/>
           </a:p>
         </p:txBody>
       </p:sp>
@@ -6453,7 +6416,6 @@
               <a:rPr lang="en-US" altLang="zh-CN"/>
               <a:t>Textbooks &amp; Reference</a:t>
             </a:r>
-            <a:endParaRPr lang="en-US" altLang="zh-CN"/>
           </a:p>
         </p:txBody>
       </p:sp>
@@ -6541,7 +6503,6 @@
               <a:rPr lang="en-US" altLang="zh-CN" dirty="0"/>
               <a:t>sources</a:t>
             </a:r>
-            <a:endParaRPr lang="en-US" altLang="zh-CN" dirty="0"/>
           </a:p>
           <a:p>
             <a:pPr eaLnBrk="1" hangingPunct="1"/>
@@ -6581,7 +6542,6 @@
               <a:rPr lang="en-US" altLang="zh-CN" dirty="0"/>
               <a:t>useful:</a:t>
             </a:r>
-            <a:endParaRPr lang="en-US" altLang="zh-CN" dirty="0"/>
           </a:p>
           <a:p>
             <a:pPr lvl="1" eaLnBrk="1" hangingPunct="1"/>
@@ -6589,7 +6549,6 @@
               <a:rPr lang="en-US" altLang="zh-CN" i="1" dirty="0"/>
               <a:t>A Mathematical Introduction to Logic</a:t>
             </a:r>
-            <a:endParaRPr lang="en-US" altLang="zh-CN" i="1" dirty="0"/>
           </a:p>
           <a:p>
             <a:pPr lvl="1" eaLnBrk="1" hangingPunct="1"/>
@@ -6597,7 +6556,6 @@
               <a:rPr lang="en-US" altLang="zh-CN" i="1" dirty="0"/>
               <a:t>Constructive Logic</a:t>
             </a:r>
-            <a:endParaRPr lang="en-US" altLang="zh-CN" i="1" dirty="0"/>
           </a:p>
           <a:p>
             <a:pPr lvl="1" eaLnBrk="1" hangingPunct="1"/>
@@ -6605,7 +6563,6 @@
               <a:rPr lang="en-US" altLang="zh-CN" i="1" dirty="0"/>
               <a:t>Lectures on the Curry-Howard Isomorphism</a:t>
             </a:r>
-            <a:endParaRPr lang="en-US" altLang="zh-CN" i="1" dirty="0"/>
           </a:p>
           <a:p>
             <a:pPr lvl="1" eaLnBrk="1" hangingPunct="1"/>
@@ -6629,7 +6586,6 @@
               <a:rPr lang="en-US" altLang="zh-CN" i="1" dirty="0"/>
               <a:t>An Algorithmic Point of View</a:t>
             </a:r>
-            <a:endParaRPr lang="en-US" altLang="zh-CN" i="1" dirty="0"/>
           </a:p>
           <a:p>
             <a:pPr lvl="1" eaLnBrk="1" hangingPunct="1"/>
@@ -6689,7 +6645,6 @@
               <a:rPr lang="en-US" altLang="zh-CN" dirty="0"/>
               <a:t>Discussion</a:t>
             </a:r>
-            <a:endParaRPr lang="en-US" altLang="zh-CN" dirty="0"/>
           </a:p>
         </p:txBody>
       </p:sp>
@@ -6777,7 +6732,6 @@
               <a:rPr lang="en-US" altLang="zh-CN" dirty="0"/>
               <a:t>Piazza</a:t>
             </a:r>
-            <a:endParaRPr lang="en-US" altLang="zh-CN" dirty="0"/>
           </a:p>
           <a:p>
             <a:pPr lvl="1" eaLnBrk="1" hangingPunct="1"/>
@@ -6809,7 +6763,6 @@
               <a:rPr lang="en-US" altLang="zh-CN" dirty="0"/>
               <a:t>pages</a:t>
             </a:r>
-            <a:endParaRPr lang="en-US" altLang="zh-CN" dirty="0"/>
           </a:p>
           <a:p>
             <a:pPr eaLnBrk="1" hangingPunct="1"/>
@@ -6905,7 +6858,6 @@
               <a:rPr lang="en-US" altLang="zh-CN" dirty="0"/>
               <a:t>group</a:t>
             </a:r>
-            <a:endParaRPr lang="en-US" altLang="zh-CN" dirty="0"/>
           </a:p>
           <a:p>
             <a:pPr lvl="1" eaLnBrk="1" hangingPunct="1"/>
@@ -6929,7 +6881,6 @@
               <a:rPr lang="en-US" altLang="zh-CN" dirty="0"/>
               <a:t>open</a:t>
             </a:r>
-            <a:endParaRPr lang="en-US" altLang="zh-CN" dirty="0"/>
           </a:p>
           <a:p>
             <a:pPr lvl="1" eaLnBrk="1" hangingPunct="1"/>
@@ -6969,7 +6920,6 @@
               <a:rPr lang="en-US" altLang="zh-CN" dirty="0"/>
               <a:t>question</a:t>
             </a:r>
-            <a:endParaRPr lang="en-US" altLang="zh-CN" dirty="0"/>
           </a:p>
         </p:txBody>
       </p:sp>
@@ -7018,7 +6968,6 @@
               <a:rPr lang="en-US" altLang="zh-CN"/>
               <a:t>Grading</a:t>
             </a:r>
-            <a:endParaRPr lang="en-US" altLang="zh-CN"/>
           </a:p>
         </p:txBody>
       </p:sp>
@@ -7040,25 +6989,23 @@
             <a:pPr eaLnBrk="1" hangingPunct="1"/>
             <a:r>
               <a:rPr lang="en-US" altLang="zh-CN" dirty="0"/>
-              <a:t>40% for homework</a:t>
-            </a:r>
-            <a:endParaRPr lang="en-US" altLang="zh-CN" dirty="0"/>
+              <a:t>30% for homework</a:t>
+            </a:r>
           </a:p>
           <a:p>
             <a:pPr eaLnBrk="1" hangingPunct="1"/>
             <a:r>
               <a:rPr lang="en-US" altLang="zh-CN" dirty="0"/>
-              <a:t>30% for middle test I</a:t>
-            </a:r>
-            <a:endParaRPr lang="en-US" altLang="zh-CN" dirty="0"/>
-          </a:p>
-          <a:p>
-            <a:pPr eaLnBrk="1" hangingPunct="1"/>
-            <a:r>
-              <a:rPr lang="en-US" altLang="zh-CN" dirty="0"/>
-              <a:t>30% for final test</a:t>
-            </a:r>
-            <a:endParaRPr lang="en-US" altLang="zh-CN" dirty="0"/>
+              <a:t>70% </a:t>
+            </a:r>
+            <a:r>
+              <a:rPr lang="en-US" altLang="zh-CN"/>
+              <a:t>for final </a:t>
+            </a:r>
+            <a:r>
+              <a:rPr lang="en-US" altLang="zh-CN" dirty="0"/>
+              <a:t>test</a:t>
+            </a:r>
           </a:p>
         </p:txBody>
       </p:sp>
@@ -7107,7 +7054,6 @@
               <a:rPr lang="en-US" altLang="zh-CN"/>
               <a:t>Summary</a:t>
             </a:r>
-            <a:endParaRPr lang="en-US" altLang="zh-CN"/>
           </a:p>
         </p:txBody>
       </p:sp>
@@ -7163,7 +7109,6 @@
               <a:rPr lang="en-US" altLang="zh-CN" dirty="0"/>
               <a:t>practice</a:t>
             </a:r>
-            <a:endParaRPr lang="en-US" altLang="zh-CN" dirty="0"/>
           </a:p>
           <a:p>
             <a:pPr lvl="1" eaLnBrk="1" hangingPunct="1"/>
@@ -7243,7 +7188,6 @@
               <a:rPr lang="en-US" altLang="zh-CN" dirty="0"/>
               <a:t>problems</a:t>
             </a:r>
-            <a:endParaRPr lang="en-US" altLang="zh-CN" dirty="0"/>
           </a:p>
           <a:p>
             <a:pPr eaLnBrk="1" hangingPunct="1"/>
@@ -7387,7 +7331,6 @@
               <a:rPr lang="en-US" altLang="zh-CN" dirty="0"/>
               <a:t>math/CS</a:t>
             </a:r>
-            <a:endParaRPr lang="en-US" altLang="zh-CN" dirty="0"/>
           </a:p>
         </p:txBody>
       </p:sp>
@@ -7436,7 +7379,6 @@
               <a:rPr lang="en-US" altLang="zh-CN"/>
               <a:t>Last Thing</a:t>
             </a:r>
-            <a:endParaRPr lang="en-US" altLang="zh-CN"/>
           </a:p>
         </p:txBody>
       </p:sp>
@@ -7484,7 +7426,6 @@
               <a:rPr lang="en-US" altLang="zh-CN" dirty="0"/>
               <a:t>install the software</a:t>
             </a:r>
-            <a:endParaRPr lang="en-US" altLang="zh-CN" dirty="0"/>
           </a:p>
           <a:p>
             <a:pPr eaLnBrk="1" hangingPunct="1"/>
@@ -7500,7 +7441,6 @@
               <a:rPr lang="en-US" altLang="zh-CN" dirty="0"/>
               <a:t>reading</a:t>
             </a:r>
-            <a:endParaRPr lang="en-US" altLang="zh-CN" dirty="0"/>
           </a:p>
           <a:p>
             <a:pPr lvl="1" eaLnBrk="1" hangingPunct="1"/>
@@ -7620,7 +7560,6 @@
               <a:rPr lang="en-US" altLang="zh-CN" dirty="0"/>
               <a:t>group</a:t>
             </a:r>
-            <a:endParaRPr lang="en-US" altLang="zh-CN" dirty="0"/>
           </a:p>
           <a:p>
             <a:pPr lvl="1" eaLnBrk="1" hangingPunct="1"/>
@@ -7676,7 +7615,6 @@
               <a:rPr lang="en-US" altLang="zh-CN" dirty="0"/>
               <a:t>help</a:t>
             </a:r>
-            <a:endParaRPr lang="en-US" altLang="zh-CN" dirty="0"/>
           </a:p>
           <a:p>
             <a:pPr eaLnBrk="1" hangingPunct="1"/>
@@ -7731,7 +7669,7 @@
             </a:r>
             <a:r>
               <a:rPr lang="en-US" altLang="zh-CN">
-                <a:latin typeface="Verdana" panose="020B0804030504040204" pitchFamily="34" charset="0"/>
+                <a:latin typeface="Verdana" panose="020B0604030504040204" pitchFamily="34" charset="0"/>
               </a:rPr>
               <a:t>…</a:t>
             </a:r>
@@ -7767,7 +7705,6 @@
               <a:rPr lang="en-US" altLang="zh-CN"/>
               <a:t>(in CS)</a:t>
             </a:r>
-            <a:endParaRPr lang="en-US" altLang="zh-CN"/>
           </a:p>
           <a:p>
             <a:pPr lvl="1" eaLnBrk="1" hangingPunct="1"/>
@@ -7775,7 +7712,6 @@
               <a:rPr lang="en-US" altLang="zh-CN"/>
               <a:t>Calculus in algorithm analysis</a:t>
             </a:r>
-            <a:endParaRPr lang="en-US" altLang="zh-CN"/>
           </a:p>
           <a:p>
             <a:pPr lvl="1" eaLnBrk="1" hangingPunct="1"/>
@@ -7783,7 +7719,6 @@
               <a:rPr lang="en-US" altLang="zh-CN"/>
               <a:t>Discrete mathematics in data structures</a:t>
             </a:r>
-            <a:endParaRPr lang="en-US" altLang="zh-CN"/>
           </a:p>
           <a:p>
             <a:pPr lvl="1" eaLnBrk="1" hangingPunct="1"/>
@@ -7799,7 +7734,6 @@
               <a:rPr lang="en-US" altLang="zh-CN"/>
               <a:t>etc..</a:t>
             </a:r>
-            <a:endParaRPr lang="en-US" altLang="zh-CN"/>
           </a:p>
           <a:p>
             <a:pPr eaLnBrk="1" hangingPunct="1"/>
@@ -7807,7 +7741,6 @@
               <a:rPr lang="en-US" altLang="zh-CN"/>
               <a:t>A different viewpoint in this course</a:t>
             </a:r>
-            <a:endParaRPr lang="en-US" altLang="zh-CN"/>
           </a:p>
           <a:p>
             <a:pPr lvl="1" eaLnBrk="1" hangingPunct="1"/>
@@ -7815,7 +7748,6 @@
               <a:rPr lang="en-US" altLang="zh-CN"/>
               <a:t>Mathematical logics</a:t>
             </a:r>
-            <a:endParaRPr lang="en-US" altLang="zh-CN"/>
           </a:p>
           <a:p>
             <a:pPr lvl="2" eaLnBrk="1" hangingPunct="1"/>
@@ -7823,7 +7755,6 @@
               <a:rPr lang="en-US" altLang="zh-CN"/>
               <a:t>The formal syntax</a:t>
             </a:r>
-            <a:endParaRPr lang="en-US" altLang="zh-CN"/>
           </a:p>
           <a:p>
             <a:pPr lvl="2" eaLnBrk="1" hangingPunct="1"/>
@@ -7831,7 +7762,6 @@
               <a:rPr lang="en-US" altLang="zh-CN"/>
               <a:t>The proof system</a:t>
             </a:r>
-            <a:endParaRPr lang="en-US" altLang="zh-CN"/>
           </a:p>
           <a:p>
             <a:pPr lvl="2" eaLnBrk="1" hangingPunct="1"/>
@@ -7839,7 +7769,6 @@
               <a:rPr lang="en-US" altLang="zh-CN"/>
               <a:t>The satisfiability problem</a:t>
             </a:r>
-            <a:endParaRPr lang="en-US" altLang="zh-CN"/>
           </a:p>
         </p:txBody>
       </p:sp>
@@ -7888,7 +7817,6 @@
               <a:rPr lang="en-US" altLang="zh-CN"/>
               <a:t>…and it’s application in CS</a:t>
             </a:r>
-            <a:endParaRPr lang="en-US" altLang="zh-CN"/>
           </a:p>
         </p:txBody>
       </p:sp>
@@ -7920,7 +7848,6 @@
               <a:rPr lang="en-US" altLang="zh-CN" sz="2800" dirty="0"/>
               <a:t>testing</a:t>
             </a:r>
-            <a:endParaRPr lang="en-US" altLang="zh-CN" sz="2800" dirty="0"/>
           </a:p>
           <a:p>
             <a:pPr eaLnBrk="1" hangingPunct="1"/>
@@ -7936,7 +7863,6 @@
               <a:rPr lang="en-US" altLang="zh-CN" sz="2800" dirty="0"/>
               <a:t>verification</a:t>
             </a:r>
-            <a:endParaRPr lang="en-US" altLang="zh-CN" sz="2800" dirty="0"/>
           </a:p>
           <a:p>
             <a:pPr eaLnBrk="1" hangingPunct="1"/>
@@ -7952,7 +7878,6 @@
               <a:rPr lang="en-US" altLang="zh-CN" sz="2800" dirty="0"/>
               <a:t>synthesis</a:t>
             </a:r>
-            <a:endParaRPr lang="en-US" altLang="zh-CN" sz="2800" dirty="0"/>
           </a:p>
           <a:p>
             <a:pPr eaLnBrk="1" hangingPunct="1"/>
@@ -7968,7 +7893,6 @@
               <a:rPr lang="en-US" altLang="zh-CN" sz="2800" dirty="0"/>
               <a:t>analysis</a:t>
             </a:r>
-            <a:endParaRPr lang="en-US" altLang="zh-CN" sz="2800" dirty="0"/>
           </a:p>
           <a:p>
             <a:pPr eaLnBrk="1" hangingPunct="1"/>
@@ -7984,7 +7908,6 @@
               <a:rPr lang="en-US" altLang="zh-CN" sz="2800" dirty="0"/>
               <a:t>checking</a:t>
             </a:r>
-            <a:endParaRPr lang="en-US" altLang="zh-CN" sz="2800" dirty="0"/>
           </a:p>
           <a:p>
             <a:pPr eaLnBrk="1" hangingPunct="1"/>
@@ -8008,7 +7931,6 @@
               <a:rPr lang="en-US" altLang="zh-CN" sz="2800" dirty="0"/>
               <a:t>generation</a:t>
             </a:r>
-            <a:endParaRPr lang="en-US" altLang="zh-CN" sz="2800" dirty="0"/>
           </a:p>
           <a:p>
             <a:pPr eaLnBrk="1" hangingPunct="1"/>
@@ -8032,7 +7954,6 @@
               <a:rPr lang="en-US" altLang="zh-CN" sz="2800" dirty="0"/>
               <a:t>(polymorphism)</a:t>
             </a:r>
-            <a:endParaRPr lang="en-US" altLang="zh-CN" sz="2800" dirty="0"/>
           </a:p>
           <a:p>
             <a:pPr eaLnBrk="1" hangingPunct="1"/>
@@ -8040,7 +7961,6 @@
               <a:rPr lang="en-US" altLang="zh-CN" sz="2800" dirty="0"/>
               <a:t>Optimizations</a:t>
             </a:r>
-            <a:endParaRPr lang="en-US" altLang="zh-CN" sz="2800" dirty="0"/>
           </a:p>
           <a:p>
             <a:pPr eaLnBrk="1" hangingPunct="1"/>
@@ -8048,7 +7968,6 @@
               <a:rPr lang="en-US" altLang="zh-CN" sz="2800" dirty="0"/>
               <a:t>…</a:t>
             </a:r>
-            <a:endParaRPr lang="en-US" altLang="zh-CN" sz="2800" dirty="0"/>
           </a:p>
         </p:txBody>
       </p:sp>
@@ -8105,7 +8024,6 @@
               <a:rPr lang="en-US" altLang="zh-CN" dirty="0"/>
               <a:t>subject</a:t>
             </a:r>
-            <a:endParaRPr lang="en-US" altLang="zh-CN" dirty="0"/>
           </a:p>
         </p:txBody>
       </p:sp>
@@ -8152,11 +8070,6 @@
               </a:rPr>
               <a:t>Math</a:t>
             </a:r>
-            <a:endParaRPr kumimoji="1" lang="en-US" altLang="zh-CN" dirty="0">
-              <a:solidFill>
-                <a:schemeClr val="tx1"/>
-              </a:solidFill>
-            </a:endParaRPr>
           </a:p>
         </p:txBody>
       </p:sp>
@@ -8243,7 +8156,6 @@
               <a:rPr kumimoji="1" lang="en-US" altLang="zh-CN" dirty="0"/>
               <a:t>Formal</a:t>
             </a:r>
-            <a:endParaRPr kumimoji="1" lang="en-US" altLang="zh-CN" dirty="0"/>
           </a:p>
           <a:p>
             <a:r>
@@ -8344,7 +8256,6 @@
               <a:rPr kumimoji="1" lang="en-US" altLang="zh-CN" dirty="0"/>
               <a:t>course?</a:t>
             </a:r>
-            <a:endParaRPr kumimoji="1" lang="en-US" altLang="zh-CN" dirty="0"/>
           </a:p>
           <a:p>
             <a:pPr marL="342900" indent="-342900">
@@ -8454,7 +8365,6 @@
               <a:rPr kumimoji="1" lang="en-US" altLang="zh-CN" dirty="0"/>
               <a:t>equalities.</a:t>
             </a:r>
-            <a:endParaRPr kumimoji="1" lang="en-US" altLang="zh-CN" dirty="0"/>
           </a:p>
           <a:p>
             <a:pPr marL="342900" indent="-342900">
@@ -8521,7 +8431,6 @@
               <a:rPr kumimoji="1" lang="en-US" altLang="zh-CN" dirty="0"/>
               <a:t>math?</a:t>
             </a:r>
-            <a:endParaRPr kumimoji="1" lang="en-US" altLang="zh-CN" dirty="0"/>
           </a:p>
           <a:p>
             <a:r>
@@ -8624,7 +8533,6 @@
               <a:rPr kumimoji="1" lang="en-US" altLang="zh-CN" dirty="0"/>
               <a:t>properties).</a:t>
             </a:r>
-            <a:endParaRPr kumimoji="1" lang="en-US" altLang="zh-CN" dirty="0"/>
           </a:p>
         </p:txBody>
       </p:sp>
@@ -8697,7 +8605,6 @@
               <a:rPr lang="en-US" altLang="zh-CN"/>
               <a:t>course</a:t>
             </a:r>
-            <a:endParaRPr lang="en-US" altLang="zh-CN"/>
           </a:p>
         </p:txBody>
       </p:sp>
@@ -8733,7 +8640,6 @@
               <a:rPr lang="en-US" altLang="zh-CN"/>
               <a:t> about programs, language, and systems</a:t>
             </a:r>
-            <a:endParaRPr lang="en-US" altLang="zh-CN"/>
           </a:p>
           <a:p>
             <a:pPr lvl="1" eaLnBrk="1" hangingPunct="1">
@@ -8769,7 +8675,6 @@
               <a:rPr lang="en-US" altLang="zh-CN"/>
               <a:t>completeness</a:t>
             </a:r>
-            <a:endParaRPr lang="en-US" altLang="zh-CN"/>
           </a:p>
           <a:p>
             <a:pPr eaLnBrk="1" hangingPunct="1">
@@ -8809,7 +8714,6 @@
               <a:rPr lang="en-US" altLang="zh-CN"/>
               <a:t>:</a:t>
             </a:r>
-            <a:endParaRPr lang="en-US" altLang="zh-CN"/>
           </a:p>
           <a:p>
             <a:pPr lvl="1" eaLnBrk="1" hangingPunct="1">
@@ -8853,7 +8757,6 @@
               <a:rPr lang="en-US" altLang="zh-CN"/>
               <a:t>logic</a:t>
             </a:r>
-            <a:endParaRPr lang="en-US" altLang="zh-CN"/>
           </a:p>
           <a:p>
             <a:pPr lvl="1" eaLnBrk="1" hangingPunct="1">
@@ -8881,7 +8784,6 @@
               <a:rPr lang="en-US" altLang="zh-CN"/>
               <a:t>theory</a:t>
             </a:r>
-            <a:endParaRPr lang="en-US" altLang="zh-CN"/>
           </a:p>
           <a:p>
             <a:pPr eaLnBrk="1" hangingPunct="1">
@@ -8901,7 +8803,6 @@
               <a:rPr lang="en-US" altLang="zh-CN"/>
               <a:t>:</a:t>
             </a:r>
-            <a:endParaRPr lang="en-US" altLang="zh-CN"/>
           </a:p>
           <a:p>
             <a:pPr lvl="1" eaLnBrk="1" hangingPunct="1">
@@ -8937,7 +8838,6 @@
               <a:rPr lang="en-US" altLang="zh-CN"/>
               <a:t>fields</a:t>
             </a:r>
-            <a:endParaRPr lang="en-US" altLang="zh-CN"/>
           </a:p>
         </p:txBody>
       </p:sp>
@@ -9018,7 +8918,6 @@
               <a:rPr lang="en-US" altLang="zh-CN"/>
               <a:t>cont’</a:t>
             </a:r>
-            <a:endParaRPr lang="en-US" altLang="zh-CN"/>
           </a:p>
         </p:txBody>
       </p:sp>
@@ -9110,7 +9009,6 @@
               <a:rPr kumimoji="1" lang="en-US" altLang="zh-CN" dirty="0"/>
               <a:t>Proof/</a:t>
             </a:r>
-            <a:endParaRPr kumimoji="1" lang="en-US" altLang="zh-CN" dirty="0"/>
           </a:p>
           <a:p>
             <a:pPr algn="ctr">
@@ -9326,7 +9224,6 @@
               <a:rPr lang="en-US" altLang="zh-CN"/>
               <a:t>History and perspective</a:t>
             </a:r>
-            <a:endParaRPr lang="en-US" altLang="zh-CN"/>
           </a:p>
         </p:txBody>
       </p:sp>
@@ -9374,7 +9271,6 @@
               <a:rPr lang="en-US" altLang="zh-CN" dirty="0"/>
               <a:t>&amp; well-developed:</a:t>
             </a:r>
-            <a:endParaRPr lang="en-US" altLang="zh-CN" dirty="0"/>
           </a:p>
           <a:p>
             <a:pPr lvl="1" eaLnBrk="1" hangingPunct="1"/>
@@ -9382,7 +9278,6 @@
               <a:rPr lang="en-US" altLang="zh-CN" dirty="0"/>
               <a:t>From Plato 2000 years ago, to Gödel today</a:t>
             </a:r>
-            <a:endParaRPr lang="en-US" altLang="zh-CN" dirty="0"/>
           </a:p>
           <a:p>
             <a:pPr lvl="1" eaLnBrk="1" hangingPunct="1"/>
@@ -9390,7 +9285,6 @@
               <a:rPr lang="en-US" altLang="zh-CN" dirty="0"/>
               <a:t>Wide applications</a:t>
             </a:r>
-            <a:endParaRPr lang="en-US" altLang="zh-CN" dirty="0"/>
           </a:p>
           <a:p>
             <a:pPr lvl="2" eaLnBrk="1" hangingPunct="1"/>
@@ -9446,7 +9340,6 @@
               <a:rPr lang="en-US" altLang="zh-CN" dirty="0"/>
               <a:t>CS</a:t>
             </a:r>
-            <a:endParaRPr lang="en-US" altLang="zh-CN" dirty="0"/>
           </a:p>
           <a:p>
             <a:pPr eaLnBrk="1" hangingPunct="1"/>
@@ -9454,7 +9347,6 @@
               <a:rPr lang="en-US" altLang="zh-CN" dirty="0"/>
               <a:t>Most fruitful</a:t>
             </a:r>
-            <a:endParaRPr lang="en-US" altLang="zh-CN" dirty="0"/>
           </a:p>
           <a:p>
             <a:pPr lvl="1" eaLnBrk="1" hangingPunct="1"/>
@@ -9470,7 +9362,6 @@
               <a:rPr lang="en-US" altLang="zh-CN" dirty="0"/>
               <a:t>44 totals)</a:t>
             </a:r>
-            <a:endParaRPr lang="en-US" altLang="zh-CN" dirty="0"/>
           </a:p>
           <a:p>
             <a:pPr lvl="2" eaLnBrk="1" hangingPunct="1"/>
@@ -9478,7 +9369,6 @@
               <a:rPr lang="en-US" altLang="zh-CN" dirty="0"/>
               <a:t>7 theory and algorithm</a:t>
             </a:r>
-            <a:endParaRPr lang="en-US" altLang="zh-CN" dirty="0"/>
           </a:p>
           <a:p>
             <a:pPr lvl="2" eaLnBrk="1" hangingPunct="1"/>
@@ -9486,7 +9376,6 @@
               <a:rPr lang="en-US" altLang="zh-CN" dirty="0"/>
               <a:t>7 AI</a:t>
             </a:r>
-            <a:endParaRPr lang="en-US" altLang="zh-CN" dirty="0"/>
           </a:p>
           <a:p>
             <a:pPr lvl="2" eaLnBrk="1" hangingPunct="1"/>
@@ -9494,7 +9383,6 @@
               <a:rPr lang="en-US" altLang="zh-CN" dirty="0"/>
               <a:t>3 database</a:t>
             </a:r>
-            <a:endParaRPr lang="en-US" altLang="zh-CN" dirty="0"/>
           </a:p>
         </p:txBody>
       </p:sp>
@@ -9583,7 +9471,6 @@
               <a:rPr lang="en-US" altLang="zh-CN" dirty="0"/>
               <a:t>CS?</a:t>
             </a:r>
-            <a:endParaRPr lang="en-US" altLang="zh-CN" dirty="0"/>
           </a:p>
         </p:txBody>
       </p:sp>
@@ -9704,7 +9591,6 @@
               <a:rPr lang="en-US" altLang="zh-CN" dirty="0"/>
               <a:t> W. Dijkstra</a:t>
             </a:r>
-            <a:endParaRPr lang="en-US" altLang="zh-CN" dirty="0"/>
           </a:p>
         </p:txBody>
       </p:sp>
@@ -9717,7 +9603,7 @@
           <p:nvPr/>
         </p:nvPicPr>
         <p:blipFill>
-          <a:blip r:embed="rId1">
+          <a:blip r:embed="rId2">
             <a:extLst>
               <a:ext uri="{28A0092B-C50C-407E-A947-70E740481C1C}">
                 <a14:useLocalDpi xmlns:a14="http://schemas.microsoft.com/office/drawing/2010/main" val="0"/>
@@ -9783,7 +9669,6 @@
               <a:rPr lang="en-US" altLang="zh-CN"/>
               <a:t> </a:t>
             </a:r>
-            <a:endParaRPr lang="en-US" altLang="zh-CN"/>
           </a:p>
         </p:txBody>
       </p:sp>
@@ -9810,7 +9695,6 @@
               <a:rPr lang="en-US" altLang="zh-CN"/>
               <a:t> </a:t>
             </a:r>
-            <a:endParaRPr lang="en-US" altLang="zh-CN"/>
           </a:p>
         </p:txBody>
       </p:sp>
@@ -9873,7 +9757,7 @@
                 <a:solidFill>
                   <a:schemeClr val="tx1"/>
                 </a:solidFill>
-                <a:latin typeface="Tahoma" panose="020B0604030504040204" pitchFamily="34" charset="0"/>
+                <a:latin typeface="Tahoma" panose="020B0804030504040204" pitchFamily="34" charset="0"/>
                 <a:ea typeface="宋体" panose="02010600030101010101" pitchFamily="2" charset="-122"/>
               </a:defRPr>
             </a:lvl1pPr>
@@ -9891,7 +9775,7 @@
                 <a:solidFill>
                   <a:schemeClr val="tx1"/>
                 </a:solidFill>
-                <a:latin typeface="Tahoma" panose="020B0604030504040204" pitchFamily="34" charset="0"/>
+                <a:latin typeface="Tahoma" panose="020B0804030504040204" pitchFamily="34" charset="0"/>
                 <a:ea typeface="宋体" panose="02010600030101010101" pitchFamily="2" charset="-122"/>
               </a:defRPr>
             </a:lvl2pPr>
@@ -9909,7 +9793,7 @@
                 <a:solidFill>
                   <a:schemeClr val="tx1"/>
                 </a:solidFill>
-                <a:latin typeface="Tahoma" panose="020B0604030504040204" pitchFamily="34" charset="0"/>
+                <a:latin typeface="Tahoma" panose="020B0804030504040204" pitchFamily="34" charset="0"/>
                 <a:ea typeface="宋体" panose="02010600030101010101" pitchFamily="2" charset="-122"/>
               </a:defRPr>
             </a:lvl3pPr>
@@ -9927,7 +9811,7 @@
                 <a:solidFill>
                   <a:schemeClr val="tx1"/>
                 </a:solidFill>
-                <a:latin typeface="Tahoma" panose="020B0604030504040204" pitchFamily="34" charset="0"/>
+                <a:latin typeface="Tahoma" panose="020B0804030504040204" pitchFamily="34" charset="0"/>
                 <a:ea typeface="宋体" panose="02010600030101010101" pitchFamily="2" charset="-122"/>
               </a:defRPr>
             </a:lvl4pPr>
@@ -9945,7 +9829,7 @@
                 <a:solidFill>
                   <a:schemeClr val="tx1"/>
                 </a:solidFill>
-                <a:latin typeface="Tahoma" panose="020B0604030504040204" pitchFamily="34" charset="0"/>
+                <a:latin typeface="Tahoma" panose="020B0804030504040204" pitchFamily="34" charset="0"/>
                 <a:ea typeface="宋体" panose="02010600030101010101" pitchFamily="2" charset="-122"/>
               </a:defRPr>
             </a:lvl5pPr>
@@ -9966,7 +9850,7 @@
                 <a:solidFill>
                   <a:schemeClr val="tx1"/>
                 </a:solidFill>
-                <a:latin typeface="Tahoma" panose="020B0604030504040204" pitchFamily="34" charset="0"/>
+                <a:latin typeface="Tahoma" panose="020B0804030504040204" pitchFamily="34" charset="0"/>
                 <a:ea typeface="宋体" panose="02010600030101010101" pitchFamily="2" charset="-122"/>
               </a:defRPr>
             </a:lvl6pPr>
@@ -9987,7 +9871,7 @@
                 <a:solidFill>
                   <a:schemeClr val="tx1"/>
                 </a:solidFill>
-                <a:latin typeface="Tahoma" panose="020B0604030504040204" pitchFamily="34" charset="0"/>
+                <a:latin typeface="Tahoma" panose="020B0804030504040204" pitchFamily="34" charset="0"/>
                 <a:ea typeface="宋体" panose="02010600030101010101" pitchFamily="2" charset="-122"/>
               </a:defRPr>
             </a:lvl7pPr>
@@ -10008,7 +9892,7 @@
                 <a:solidFill>
                   <a:schemeClr val="tx1"/>
                 </a:solidFill>
-                <a:latin typeface="Tahoma" panose="020B0604030504040204" pitchFamily="34" charset="0"/>
+                <a:latin typeface="Tahoma" panose="020B0804030504040204" pitchFamily="34" charset="0"/>
                 <a:ea typeface="宋体" panose="02010600030101010101" pitchFamily="2" charset="-122"/>
               </a:defRPr>
             </a:lvl8pPr>
@@ -10029,7 +9913,7 @@
                 <a:solidFill>
                   <a:schemeClr val="tx1"/>
                 </a:solidFill>
-                <a:latin typeface="Tahoma" panose="020B0604030504040204" pitchFamily="34" charset="0"/>
+                <a:latin typeface="Tahoma" panose="020B0804030504040204" pitchFamily="34" charset="0"/>
                 <a:ea typeface="宋体" panose="02010600030101010101" pitchFamily="2" charset="-122"/>
               </a:defRPr>
             </a:lvl9pPr>
@@ -10052,11 +9936,6 @@
               </a:rPr>
               <a:t>How This Course Works</a:t>
             </a:r>
-            <a:endParaRPr lang="en-US" altLang="zh-CN" sz="3600" i="1">
-              <a:solidFill>
-                <a:schemeClr val="folHlink"/>
-              </a:solidFill>
-            </a:endParaRPr>
           </a:p>
         </p:txBody>
       </p:sp>
@@ -10288,6 +10167,7 @@
       </a:bgFillStyleLst>
     </a:fmtScheme>
   </a:themeElements>
+  <a:objectDefaults/>
   <a:extraClrSchemeLst>
     <a:extraClrScheme>
       <a:clrScheme name="Blends 1">
@@ -10822,6 +10702,8 @@
       </a:bgFillStyleLst>
     </a:fmtScheme>
   </a:themeElements>
+  <a:objectDefaults/>
+  <a:extraClrSchemeLst/>
   <a:extLst>
     <a:ext uri="{05A4C25C-085E-4340-85A3-A5531E510DB2}">
       <thm15:themeFamily xmlns:thm15="http://schemas.microsoft.com/office/thememl/2012/main" name="Office Theme" id="{62F939B6-93AF-4DB8-9C6B-D6C7DFDC589F}" vid="{4A3C46E8-61CC-4603-A589-7422A47A8E4A}"/>

</xml_diff>

<commit_message>
2023 autumn lab1&lab2 update
</commit_message>
<xml_diff>
--- a/courses/theory/slides/lec01-overview.pptx
+++ b/courses/theory/slides/lec01-overview.pptx
@@ -6009,6 +6009,11 @@
               <a:rPr lang="en-US" altLang="zh-CN" sz="2000" dirty="0"/>
               <a:t>/courses/theory/</a:t>
             </a:r>
+            <a:r>
+              <a:rPr lang="en-US" altLang="zh-CN" sz="2000" dirty="0" err="1"/>
+              <a:t>index.html</a:t>
+            </a:r>
+            <a:endParaRPr lang="en-US" altLang="zh-CN" sz="2000" dirty="0"/>
           </a:p>
           <a:p>
             <a:pPr eaLnBrk="1" hangingPunct="1"/>
@@ -6043,16 +6048,16 @@
           <a:p>
             <a:pPr lvl="1" eaLnBrk="1" hangingPunct="1"/>
             <a:r>
-              <a:rPr lang="en-US" altLang="zh-CN" sz="2400" dirty="0"/>
-              <a:t>Meng</a:t>
+              <a:rPr lang="en-US" sz="2400" dirty="0"/>
+              <a:t>Lei</a:t>
             </a:r>
             <a:r>
               <a:rPr lang="zh-CN" altLang="en-US" sz="2400" dirty="0"/>
               <a:t> </a:t>
             </a:r>
             <a:r>
-              <a:rPr lang="en-US" altLang="zh-CN" sz="2400" dirty="0"/>
-              <a:t>Wu</a:t>
+              <a:rPr lang="en-US" sz="2400" dirty="0"/>
+              <a:t>Xia</a:t>
             </a:r>
             <a:r>
               <a:rPr lang="zh-CN" altLang="en-US" sz="2400" dirty="0"/>
@@ -6067,7 +6072,7 @@
             <a:pPr lvl="1" eaLnBrk="1" hangingPunct="1"/>
             <a:r>
               <a:rPr lang="en-US" altLang="zh-CN" sz="2400" dirty="0" err="1"/>
-              <a:t>Ziyao</a:t>
+              <a:t>Junjie</a:t>
             </a:r>
             <a:r>
               <a:rPr lang="zh-CN" altLang="en-US" sz="2400" dirty="0"/>
@@ -6075,7 +6080,7 @@
             </a:r>
             <a:r>
               <a:rPr lang="en-US" altLang="zh-CN" sz="2400" dirty="0"/>
-              <a:t>Zhang</a:t>
+              <a:t>Zhuang</a:t>
             </a:r>
             <a:r>
               <a:rPr lang="zh-CN" altLang="en-US" sz="2400" dirty="0"/>
@@ -6211,12 +6216,24 @@
           <a:p>
             <a:pPr lvl="1" eaLnBrk="1" hangingPunct="1"/>
             <a:r>
-              <a:rPr lang="en-US" altLang="zh-CN"/>
-              <a:t>Friday, </a:t>
-            </a:r>
-            <a:r>
-              <a:rPr lang="en-US" altLang="zh-CN" dirty="0"/>
-              <a:t>14pm</a:t>
+              <a:rPr lang="en-US" altLang="zh-CN" dirty="0"/>
+              <a:t>Monday</a:t>
+            </a:r>
+            <a:r>
+              <a:rPr lang="zh-CN" altLang="en-US" dirty="0"/>
+              <a:t> </a:t>
+            </a:r>
+            <a:r>
+              <a:rPr lang="en-US" altLang="zh-CN" dirty="0"/>
+              <a:t>&amp;</a:t>
+            </a:r>
+            <a:r>
+              <a:rPr lang="zh-CN" altLang="en-US" dirty="0"/>
+              <a:t> </a:t>
+            </a:r>
+            <a:r>
+              <a:rPr lang="en-US" altLang="zh-CN" dirty="0"/>
+              <a:t>Tuesday, 14pm</a:t>
             </a:r>
           </a:p>
           <a:p>

</xml_diff>